<commit_message>
updated ppt, added siteMap and added some requirements
</commit_message>
<xml_diff>
--- a/Design Specification.pptx
+++ b/Design Specification.pptx
@@ -1052,7 +1052,7 @@
         </p:nvSpPr>
         <p:spPr>
           <a:xfrm>
-            <a:off x="381300" y="685800"/>
+            <a:off x="381000" y="685800"/>
             <a:ext cx="6096000" cy="3429000"/>
           </a:xfrm>
           <a:custGeom>
@@ -1156,7 +1156,7 @@
         </p:nvSpPr>
         <p:spPr>
           <a:xfrm>
-            <a:off x="381300" y="685800"/>
+            <a:off x="381000" y="685800"/>
             <a:ext cx="6096000" cy="3429000"/>
           </a:xfrm>
           <a:custGeom>
@@ -1468,7 +1468,7 @@
         </p:nvSpPr>
         <p:spPr>
           <a:xfrm>
-            <a:off x="381300" y="685800"/>
+            <a:off x="381000" y="685800"/>
             <a:ext cx="6096000" cy="3429000"/>
           </a:xfrm>
           <a:custGeom>
@@ -1572,7 +1572,7 @@
         </p:nvSpPr>
         <p:spPr>
           <a:xfrm>
-            <a:off x="381300" y="685800"/>
+            <a:off x="381000" y="685800"/>
             <a:ext cx="6096000" cy="3429000"/>
           </a:xfrm>
           <a:custGeom>
@@ -7119,10 +7119,10 @@
               <a:buNone/>
             </a:pPr>
             <a:r>
-              <a:rPr lang="en-GB"/>
+              <a:rPr lang="en-GB" dirty="0"/>
               <a:t>The aim of our website is to give sellers a market to sell their cars for the right prices and so the users can interact with such sellers and find their best budget car or dream car. </a:t>
             </a:r>
-            <a:endParaRPr/>
+            <a:endParaRPr dirty="0"/>
           </a:p>
           <a:p>
             <a:pPr marL="0" lvl="0" indent="0" algn="l" rtl="0">
@@ -7135,10 +7135,10 @@
               <a:buNone/>
             </a:pPr>
             <a:r>
-              <a:rPr lang="en-GB"/>
-              <a:t>The user can be a buyer if they choose to. But to be a seller the user must create an account.The user can search for cars and use the filter bar to filter for specific cars. The user can also upload and sell cars. The user can also post reviews on specific cars.If a user wants to buy a car, they can message the seller, however they have a account before the user can proceed as such.</a:t>
+              <a:rPr lang="en-GB" dirty="0"/>
+              <a:t>The user can be a buyer if they choose to. But to be a seller the user must create an account. The user can search for cars and use the filter bar to filter for specific cars. The user can also upload and sell cars. The user can also post reviews on specific cars. If a user wants to buy a car, they can message the seller, however they have to have an account before the user can proceed as such.</a:t>
             </a:r>
-            <a:endParaRPr/>
+            <a:endParaRPr dirty="0"/>
           </a:p>
           <a:p>
             <a:pPr marL="0" lvl="0" indent="0" algn="l" rtl="0">
@@ -7151,10 +7151,10 @@
               <a:buNone/>
             </a:pPr>
             <a:r>
-              <a:rPr lang="en-GB"/>
+              <a:rPr lang="en-GB" dirty="0"/>
               <a:t>Each car has its own specific details and reviews. Each car can also be specified by brand, quality of use and more. This will provide more details for users to carefully pick cars. </a:t>
             </a:r>
-            <a:endParaRPr/>
+            <a:endParaRPr dirty="0"/>
           </a:p>
         </p:txBody>
       </p:sp>
@@ -7250,6 +7250,179 @@
           </a:bodyPr>
           <a:lstStyle/>
           <a:p>
+            <a:pPr marL="228600" indent="-228600">
+              <a:spcAft>
+                <a:spcPts val="1200"/>
+              </a:spcAft>
+              <a:buAutoNum type="arabicPeriod"/>
+            </a:pPr>
+            <a:r>
+              <a:rPr lang="en-GB" sz="1200" b="0" i="0" dirty="0">
+                <a:solidFill>
+                  <a:schemeClr val="tx1"/>
+                </a:solidFill>
+                <a:effectLst/>
+                <a:latin typeface="+mn-lt"/>
+              </a:rPr>
+              <a:t>User registration and authentication (</a:t>
+            </a:r>
+            <a:r>
+              <a:rPr lang="en-US" sz="1200" dirty="0">
+                <a:solidFill>
+                  <a:schemeClr val="tx1"/>
+                </a:solidFill>
+                <a:latin typeface="+mn-lt"/>
+              </a:rPr>
+              <a:t>u</a:t>
+            </a:r>
+            <a:r>
+              <a:rPr lang="en-US" sz="1200" b="0" i="0" dirty="0">
+                <a:solidFill>
+                  <a:schemeClr val="tx1"/>
+                </a:solidFill>
+                <a:effectLst/>
+                <a:latin typeface="+mn-lt"/>
+              </a:rPr>
+              <a:t>sers should be able to create an account and log in to the platform)</a:t>
+            </a:r>
+            <a:endParaRPr lang="en-GB" sz="1200" b="0" i="0" dirty="0">
+              <a:solidFill>
+                <a:schemeClr val="tx1"/>
+              </a:solidFill>
+              <a:effectLst/>
+              <a:latin typeface="+mn-lt"/>
+            </a:endParaRPr>
+          </a:p>
+          <a:p>
+            <a:pPr marL="228600" indent="-228600">
+              <a:spcAft>
+                <a:spcPts val="1200"/>
+              </a:spcAft>
+              <a:buFont typeface="Arial"/>
+              <a:buAutoNum type="arabicPeriod"/>
+            </a:pPr>
+            <a:r>
+              <a:rPr lang="en-GB" sz="1200" b="0" i="0" dirty="0">
+                <a:solidFill>
+                  <a:schemeClr val="tx1"/>
+                </a:solidFill>
+                <a:effectLst/>
+                <a:latin typeface="+mn-lt"/>
+              </a:rPr>
+              <a:t>Vehicle listings and search (</a:t>
+            </a:r>
+            <a:r>
+              <a:rPr lang="en-US" sz="1200" dirty="0">
+                <a:solidFill>
+                  <a:schemeClr val="tx1"/>
+                </a:solidFill>
+                <a:latin typeface="+mn-lt"/>
+              </a:rPr>
+              <a:t>u</a:t>
+            </a:r>
+            <a:r>
+              <a:rPr lang="en-US" sz="1200" b="0" i="0" dirty="0">
+                <a:solidFill>
+                  <a:schemeClr val="tx1"/>
+                </a:solidFill>
+                <a:effectLst/>
+                <a:latin typeface="+mn-lt"/>
+              </a:rPr>
+              <a:t>sers should be able to search for vehicles based on various criteria, such as make, model, year, price range, location, etc. They should be able to sort based on various criteria too. Sellers should be able to list their vehicles for sale, including uploading photos and providing detailed descriptions)</a:t>
+            </a:r>
+            <a:endParaRPr lang="en-GB" sz="1200" b="0" i="0" dirty="0">
+              <a:solidFill>
+                <a:schemeClr val="tx1"/>
+              </a:solidFill>
+              <a:effectLst/>
+              <a:latin typeface="+mn-lt"/>
+            </a:endParaRPr>
+          </a:p>
+          <a:p>
+            <a:pPr marL="228600" indent="-228600">
+              <a:spcAft>
+                <a:spcPts val="1200"/>
+              </a:spcAft>
+              <a:buFont typeface="Arial"/>
+              <a:buAutoNum type="arabicPeriod"/>
+            </a:pPr>
+            <a:r>
+              <a:rPr lang="en-US" sz="1200" b="0" i="0" dirty="0">
+                <a:solidFill>
+                  <a:schemeClr val="tx1"/>
+                </a:solidFill>
+                <a:effectLst/>
+                <a:latin typeface="+mn-lt"/>
+              </a:rPr>
+              <a:t>Detailed vehicle information and photos (sellers should be able to upload photos and post the required details about the car)</a:t>
+            </a:r>
+          </a:p>
+          <a:p>
+            <a:pPr marL="228600" indent="-228600">
+              <a:spcAft>
+                <a:spcPts val="1200"/>
+              </a:spcAft>
+              <a:buFont typeface="Arial"/>
+              <a:buAutoNum type="arabicPeriod"/>
+            </a:pPr>
+            <a:r>
+              <a:rPr lang="en-US" sz="1200" b="0" i="0" dirty="0">
+                <a:solidFill>
+                  <a:schemeClr val="tx1"/>
+                </a:solidFill>
+                <a:effectLst/>
+                <a:latin typeface="+mn-lt"/>
+              </a:rPr>
+              <a:t>Contact and communication between buyers and sellers ( buyers should be able to message the sellers for further details)</a:t>
+            </a:r>
+          </a:p>
+          <a:p>
+            <a:pPr marL="228600" indent="-228600">
+              <a:spcAft>
+                <a:spcPts val="1200"/>
+              </a:spcAft>
+              <a:buFont typeface="Arial"/>
+              <a:buAutoNum type="arabicPeriod"/>
+            </a:pPr>
+            <a:endParaRPr lang="en-GB" sz="1200" b="0" i="0" dirty="0">
+              <a:solidFill>
+                <a:srgbClr val="D1D5DB"/>
+              </a:solidFill>
+              <a:effectLst/>
+              <a:latin typeface="Söhne"/>
+            </a:endParaRPr>
+          </a:p>
+          <a:p>
+            <a:pPr marL="228600" indent="-228600">
+              <a:spcAft>
+                <a:spcPts val="1200"/>
+              </a:spcAft>
+              <a:buAutoNum type="arabicPeriod"/>
+            </a:pPr>
+            <a:endParaRPr lang="en-GB" sz="1200" b="0" i="0" dirty="0">
+              <a:solidFill>
+                <a:srgbClr val="D1D5DB"/>
+              </a:solidFill>
+              <a:effectLst/>
+              <a:latin typeface="+mj-lt"/>
+            </a:endParaRPr>
+          </a:p>
+          <a:p>
+            <a:pPr marL="228600" indent="-228600">
+              <a:spcAft>
+                <a:spcPts val="1200"/>
+              </a:spcAft>
+              <a:buAutoNum type="arabicPeriod"/>
+            </a:pPr>
+            <a:endParaRPr lang="en-GB" sz="1200" b="0" i="0" dirty="0">
+              <a:solidFill>
+                <a:srgbClr val="D1D5DB"/>
+              </a:solidFill>
+              <a:effectLst/>
+              <a:latin typeface="+mj-lt"/>
+            </a:endParaRPr>
+          </a:p>
+          <a:p>
             <a:pPr marL="0" lvl="0" indent="0" algn="l" rtl="0">
               <a:spcBef>
                 <a:spcPts val="0"/>
@@ -7259,7 +7432,7 @@
               </a:spcAft>
               <a:buNone/>
             </a:pPr>
-            <a:endParaRPr/>
+            <a:endParaRPr dirty="0"/>
           </a:p>
         </p:txBody>
       </p:sp>
@@ -7574,7 +7747,7 @@
               </a:spcAft>
               <a:buNone/>
             </a:pPr>
-            <a:endParaRPr/>
+            <a:endParaRPr dirty="0"/>
           </a:p>
         </p:txBody>
       </p:sp>
@@ -7679,10 +7852,40 @@
               </a:spcAft>
               <a:buNone/>
             </a:pPr>
-            <a:endParaRPr/>
+            <a:endParaRPr dirty="0"/>
           </a:p>
         </p:txBody>
       </p:sp>
+      <p:pic>
+        <p:nvPicPr>
+          <p:cNvPr id="6" name="Picture 5" descr="A screenshot of the site map&#10;">
+            <a:extLst>
+              <a:ext uri="{FF2B5EF4-FFF2-40B4-BE49-F238E27FC236}">
+                <a16:creationId xmlns:a16="http://schemas.microsoft.com/office/drawing/2014/main" id="{D586E028-FAEE-1ACA-6B1E-18ECA4255CB7}"/>
+              </a:ext>
+            </a:extLst>
+          </p:cNvPr>
+          <p:cNvPicPr>
+            <a:picLocks noChangeAspect="1"/>
+          </p:cNvPicPr>
+          <p:nvPr/>
+        </p:nvPicPr>
+        <p:blipFill>
+          <a:blip r:embed="rId3"/>
+          <a:stretch>
+            <a:fillRect/>
+          </a:stretch>
+        </p:blipFill>
+        <p:spPr>
+          <a:xfrm>
+            <a:off x="257640" y="1152475"/>
+            <a:ext cx="8574660" cy="3416400"/>
+          </a:xfrm>
+          <a:prstGeom prst="rect">
+            <a:avLst/>
+          </a:prstGeom>
+        </p:spPr>
+      </p:pic>
     </p:spTree>
   </p:cSld>
   <p:clrMapOvr>
@@ -8023,7 +8226,7 @@
                   <a:schemeClr val="dk1"/>
                 </a:solidFill>
               </a:rPr>
-              <a:t>                    	-/Home/Cars/New/</a:t>
+              <a:t>                    	    -/Home/Cars/New/</a:t>
             </a:r>
             <a:endParaRPr sz="1250" dirty="0">
               <a:solidFill>
@@ -8055,7 +8258,7 @@
                   <a:schemeClr val="dk1"/>
                 </a:solidFill>
               </a:rPr>
-              <a:t>                    	- /Home/Cars/Used/</a:t>
+              <a:t>                    	    - /Home/Cars/Used/</a:t>
             </a:r>
             <a:endParaRPr sz="1250" dirty="0">
               <a:solidFill>
@@ -8087,7 +8290,7 @@
                   <a:schemeClr val="dk1"/>
                 </a:solidFill>
               </a:rPr>
-              <a:t>        	        	-/Home/Sell-Cars            	</a:t>
+              <a:t>        	-/Home/Sell-Cars            	</a:t>
             </a:r>
             <a:endParaRPr sz="1250" dirty="0">
               <a:solidFill>
@@ -8119,7 +8322,7 @@
                   <a:schemeClr val="dk1"/>
                 </a:solidFill>
               </a:rPr>
-              <a:t>                    	        	-/Home/Sell-Cars/Car-Upload</a:t>
+              <a:t>                    		-/Home/Sell-Cars/Car-Upload</a:t>
             </a:r>
             <a:endParaRPr sz="1250" dirty="0">
               <a:solidFill>

</xml_diff>

<commit_message>
Finished with the ER diagram, System architecture and url sites
</commit_message>
<xml_diff>
--- a/Design Specification.pptx
+++ b/Design Specification.pptx
@@ -5,7 +5,7 @@
     <p:sldMasterId id="2147483659" r:id="rId1"/>
   </p:sldMasterIdLst>
   <p:notesMasterIdLst>
-    <p:notesMasterId r:id="rId13"/>
+    <p:notesMasterId r:id="rId14"/>
   </p:notesMasterIdLst>
   <p:sldIdLst>
     <p:sldId id="256" r:id="rId2"/>
@@ -16,9 +16,10 @@
     <p:sldId id="261" r:id="rId7"/>
     <p:sldId id="262" r:id="rId8"/>
     <p:sldId id="263" r:id="rId9"/>
-    <p:sldId id="264" r:id="rId10"/>
-    <p:sldId id="265" r:id="rId11"/>
-    <p:sldId id="266" r:id="rId12"/>
+    <p:sldId id="267" r:id="rId10"/>
+    <p:sldId id="264" r:id="rId11"/>
+    <p:sldId id="265" r:id="rId12"/>
+    <p:sldId id="266" r:id="rId13"/>
   </p:sldIdLst>
   <p:sldSz cx="9144000" cy="5143500" type="screen16x9"/>
   <p:notesSz cx="6858000" cy="9144000"/>
@@ -1676,7 +1677,7 @@
         </p:nvSpPr>
         <p:spPr>
           <a:xfrm>
-            <a:off x="381300" y="685800"/>
+            <a:off x="381000" y="685800"/>
             <a:ext cx="6096000" cy="3429000"/>
           </a:xfrm>
           <a:custGeom>
@@ -6718,6 +6719,441 @@
   <p:cSld>
     <p:spTree>
       <p:nvGrpSpPr>
+        <p:cNvPr id="1" name="Shape 103"/>
+        <p:cNvGrpSpPr/>
+        <p:nvPr/>
+      </p:nvGrpSpPr>
+      <p:grpSpPr>
+        <a:xfrm>
+          <a:off x="0" y="0"/>
+          <a:ext cx="0" cy="0"/>
+          <a:chOff x="0" y="0"/>
+          <a:chExt cx="0" cy="0"/>
+        </a:xfrm>
+      </p:grpSpPr>
+      <p:sp>
+        <p:nvSpPr>
+          <p:cNvPr id="104" name="Google Shape;104;p21"/>
+          <p:cNvSpPr txBox="1">
+            <a:spLocks noGrp="1"/>
+          </p:cNvSpPr>
+          <p:nvPr>
+            <p:ph type="title"/>
+          </p:nvPr>
+        </p:nvSpPr>
+        <p:spPr>
+          <a:xfrm>
+            <a:off x="159125" y="96325"/>
+            <a:ext cx="8520600" cy="572700"/>
+          </a:xfrm>
+          <a:prstGeom prst="rect">
+            <a:avLst/>
+          </a:prstGeom>
+        </p:spPr>
+        <p:txBody>
+          <a:bodyPr spcFirstLastPara="1" wrap="square" lIns="91425" tIns="91425" rIns="91425" bIns="91425" anchor="t" anchorCtr="0">
+            <a:normAutofit fontScale="90000"/>
+          </a:bodyPr>
+          <a:lstStyle/>
+          <a:p>
+            <a:pPr marL="0" lvl="0" indent="0" algn="ctr" rtl="0">
+              <a:spcBef>
+                <a:spcPts val="0"/>
+              </a:spcBef>
+              <a:spcAft>
+                <a:spcPts val="0"/>
+              </a:spcAft>
+              <a:buNone/>
+            </a:pPr>
+            <a:r>
+              <a:rPr lang="en-GB" u="sng"/>
+              <a:t>URLS</a:t>
+            </a:r>
+            <a:endParaRPr u="sng"/>
+          </a:p>
+        </p:txBody>
+      </p:sp>
+      <p:sp>
+        <p:nvSpPr>
+          <p:cNvPr id="105" name="Google Shape;105;p21"/>
+          <p:cNvSpPr txBox="1">
+            <a:spLocks noGrp="1"/>
+          </p:cNvSpPr>
+          <p:nvPr>
+            <p:ph type="body" idx="1"/>
+          </p:nvPr>
+        </p:nvSpPr>
+        <p:spPr>
+          <a:xfrm>
+            <a:off x="0" y="607600"/>
+            <a:ext cx="9054790" cy="4535900"/>
+          </a:xfrm>
+          <a:prstGeom prst="rect">
+            <a:avLst/>
+          </a:prstGeom>
+        </p:spPr>
+        <p:txBody>
+          <a:bodyPr spcFirstLastPara="1" wrap="square" lIns="91425" tIns="91425" rIns="91425" bIns="91425" anchor="t" anchorCtr="0">
+            <a:noAutofit/>
+          </a:bodyPr>
+          <a:lstStyle/>
+          <a:p>
+            <a:pPr marL="0" lvl="0" indent="0" algn="l" rtl="0">
+              <a:lnSpc>
+                <a:spcPct val="105000"/>
+              </a:lnSpc>
+              <a:spcBef>
+                <a:spcPts val="1200"/>
+              </a:spcBef>
+              <a:spcAft>
+                <a:spcPts val="0"/>
+              </a:spcAft>
+              <a:buClr>
+                <a:schemeClr val="dk1"/>
+              </a:buClr>
+              <a:buSzPts val="275"/>
+              <a:buFont typeface="Arial"/>
+              <a:buNone/>
+            </a:pPr>
+            <a:r>
+              <a:rPr lang="en-GB" sz="1250" dirty="0">
+                <a:solidFill>
+                  <a:schemeClr val="dk1"/>
+                </a:solidFill>
+              </a:rPr>
+              <a:t>-/Home</a:t>
+            </a:r>
+            <a:endParaRPr sz="1250" dirty="0">
+              <a:solidFill>
+                <a:schemeClr val="dk1"/>
+              </a:solidFill>
+            </a:endParaRPr>
+          </a:p>
+          <a:p>
+            <a:pPr marL="0" lvl="0" indent="0" algn="l" rtl="0">
+              <a:lnSpc>
+                <a:spcPct val="105000"/>
+              </a:lnSpc>
+              <a:spcBef>
+                <a:spcPts val="1200"/>
+              </a:spcBef>
+              <a:spcAft>
+                <a:spcPts val="0"/>
+              </a:spcAft>
+              <a:buClr>
+                <a:schemeClr val="dk1"/>
+              </a:buClr>
+              <a:buSzPts val="275"/>
+              <a:buFont typeface="Arial"/>
+              <a:buNone/>
+            </a:pPr>
+            <a:r>
+              <a:rPr lang="en-GB" sz="1250" dirty="0">
+                <a:solidFill>
+                  <a:schemeClr val="dk1"/>
+                </a:solidFill>
+              </a:rPr>
+              <a:t>        	</a:t>
+            </a:r>
+            <a:r>
+              <a:rPr lang="en-US" sz="1250" dirty="0">
+                <a:solidFill>
+                  <a:schemeClr val="dk1"/>
+                </a:solidFill>
+              </a:rPr>
+              <a:t> -/Home/Cars</a:t>
+            </a:r>
+          </a:p>
+          <a:p>
+            <a:pPr marL="0" lvl="0" indent="0" algn="l" rtl="0">
+              <a:lnSpc>
+                <a:spcPct val="105000"/>
+              </a:lnSpc>
+              <a:spcBef>
+                <a:spcPts val="1200"/>
+              </a:spcBef>
+              <a:spcAft>
+                <a:spcPts val="0"/>
+              </a:spcAft>
+              <a:buClr>
+                <a:schemeClr val="dk1"/>
+              </a:buClr>
+              <a:buSzPts val="275"/>
+              <a:buFont typeface="Arial"/>
+              <a:buNone/>
+            </a:pPr>
+            <a:r>
+              <a:rPr lang="en-US" sz="1250" dirty="0">
+                <a:solidFill>
+                  <a:schemeClr val="dk1"/>
+                </a:solidFill>
+              </a:rPr>
+              <a:t>                    	    -/Home/Cars/New</a:t>
+            </a:r>
+          </a:p>
+          <a:p>
+            <a:pPr marL="0" lvl="0" indent="0" algn="l" rtl="0">
+              <a:lnSpc>
+                <a:spcPct val="105000"/>
+              </a:lnSpc>
+              <a:spcBef>
+                <a:spcPts val="1200"/>
+              </a:spcBef>
+              <a:spcAft>
+                <a:spcPts val="0"/>
+              </a:spcAft>
+              <a:buClr>
+                <a:schemeClr val="dk1"/>
+              </a:buClr>
+              <a:buSzPts val="275"/>
+              <a:buFont typeface="Arial"/>
+              <a:buNone/>
+            </a:pPr>
+            <a:r>
+              <a:rPr lang="en-US" sz="1250" dirty="0">
+                <a:solidFill>
+                  <a:schemeClr val="dk1"/>
+                </a:solidFill>
+              </a:rPr>
+              <a:t>                    	    - /Home/Cars/Used</a:t>
+            </a:r>
+          </a:p>
+          <a:p>
+            <a:pPr marL="0" lvl="0" indent="0" algn="l" rtl="0">
+              <a:lnSpc>
+                <a:spcPct val="105000"/>
+              </a:lnSpc>
+              <a:spcBef>
+                <a:spcPts val="1200"/>
+              </a:spcBef>
+              <a:spcAft>
+                <a:spcPts val="0"/>
+              </a:spcAft>
+              <a:buClr>
+                <a:schemeClr val="dk1"/>
+              </a:buClr>
+              <a:buSzPts val="275"/>
+              <a:buFont typeface="Arial"/>
+              <a:buNone/>
+            </a:pPr>
+            <a:r>
+              <a:rPr lang="en-US" sz="1250" dirty="0">
+                <a:solidFill>
+                  <a:schemeClr val="dk1"/>
+                </a:solidFill>
+              </a:rPr>
+              <a:t>        	    -/Home/Cars/Sell-My-Car            	</a:t>
+            </a:r>
+          </a:p>
+          <a:p>
+            <a:pPr marL="0" lvl="0" indent="0" algn="l" rtl="0">
+              <a:lnSpc>
+                <a:spcPct val="105000"/>
+              </a:lnSpc>
+              <a:spcBef>
+                <a:spcPts val="1200"/>
+              </a:spcBef>
+              <a:spcAft>
+                <a:spcPts val="0"/>
+              </a:spcAft>
+              <a:buClr>
+                <a:schemeClr val="dk1"/>
+              </a:buClr>
+              <a:buSzPts val="275"/>
+              <a:buFont typeface="Arial"/>
+              <a:buNone/>
+            </a:pPr>
+            <a:r>
+              <a:rPr lang="en-US" sz="1250" dirty="0">
+                <a:solidFill>
+                  <a:schemeClr val="dk1"/>
+                </a:solidFill>
+              </a:rPr>
+              <a:t>                    		-/Home/Sell-Cars/Car-Upload</a:t>
+            </a:r>
+          </a:p>
+          <a:p>
+            <a:pPr marL="0" lvl="0" indent="0" algn="l" rtl="0">
+              <a:lnSpc>
+                <a:spcPct val="105000"/>
+              </a:lnSpc>
+              <a:spcBef>
+                <a:spcPts val="1200"/>
+              </a:spcBef>
+              <a:spcAft>
+                <a:spcPts val="0"/>
+              </a:spcAft>
+              <a:buClr>
+                <a:schemeClr val="dk1"/>
+              </a:buClr>
+              <a:buSzPts val="275"/>
+              <a:buFont typeface="Arial"/>
+              <a:buNone/>
+            </a:pPr>
+            <a:r>
+              <a:rPr lang="en-US" sz="1250" dirty="0">
+                <a:solidFill>
+                  <a:schemeClr val="dk1"/>
+                </a:solidFill>
+              </a:rPr>
+              <a:t>                    	    -/Home/Electric</a:t>
+            </a:r>
+          </a:p>
+          <a:p>
+            <a:pPr marL="0" lvl="0" indent="0" algn="l" rtl="0">
+              <a:lnSpc>
+                <a:spcPct val="105000"/>
+              </a:lnSpc>
+              <a:spcBef>
+                <a:spcPts val="1200"/>
+              </a:spcBef>
+              <a:spcAft>
+                <a:spcPts val="0"/>
+              </a:spcAft>
+              <a:buClr>
+                <a:schemeClr val="dk1"/>
+              </a:buClr>
+              <a:buSzPts val="275"/>
+              <a:buFont typeface="Arial"/>
+              <a:buNone/>
+            </a:pPr>
+            <a:r>
+              <a:rPr lang="en-US" sz="1250" dirty="0">
+                <a:solidFill>
+                  <a:schemeClr val="dk1"/>
+                </a:solidFill>
+              </a:rPr>
+              <a:t>                   	    -/Home/Cars/Car-Details</a:t>
+            </a:r>
+          </a:p>
+          <a:p>
+            <a:pPr marL="0" lvl="0" indent="0" algn="l" rtl="0">
+              <a:lnSpc>
+                <a:spcPct val="105000"/>
+              </a:lnSpc>
+              <a:spcBef>
+                <a:spcPts val="1200"/>
+              </a:spcBef>
+              <a:spcAft>
+                <a:spcPts val="0"/>
+              </a:spcAft>
+              <a:buClr>
+                <a:schemeClr val="dk1"/>
+              </a:buClr>
+              <a:buSzPts val="275"/>
+              <a:buFont typeface="Arial"/>
+              <a:buNone/>
+            </a:pPr>
+            <a:r>
+              <a:rPr lang="en-US" sz="1250" dirty="0">
+                <a:solidFill>
+                  <a:schemeClr val="dk1"/>
+                </a:solidFill>
+              </a:rPr>
+              <a:t>                    	    -/Home/Cars/Car-Brand</a:t>
+            </a:r>
+          </a:p>
+          <a:p>
+            <a:pPr marL="0" lvl="0" indent="0" algn="l" rtl="0">
+              <a:lnSpc>
+                <a:spcPct val="105000"/>
+              </a:lnSpc>
+              <a:spcBef>
+                <a:spcPts val="1200"/>
+              </a:spcBef>
+              <a:spcAft>
+                <a:spcPts val="0"/>
+              </a:spcAft>
+              <a:buClr>
+                <a:schemeClr val="dk1"/>
+              </a:buClr>
+              <a:buSzPts val="275"/>
+              <a:buFont typeface="Arial"/>
+              <a:buNone/>
+            </a:pPr>
+            <a:r>
+              <a:rPr lang="en-US" sz="1250" dirty="0">
+                <a:solidFill>
+                  <a:schemeClr val="dk1"/>
+                </a:solidFill>
+              </a:rPr>
+              <a:t>        	    -/Home/Log-In</a:t>
+            </a:r>
+          </a:p>
+          <a:p>
+            <a:pPr marL="0" lvl="0" indent="0" algn="l" rtl="0">
+              <a:lnSpc>
+                <a:spcPct val="105000"/>
+              </a:lnSpc>
+              <a:spcBef>
+                <a:spcPts val="1200"/>
+              </a:spcBef>
+              <a:spcAft>
+                <a:spcPts val="0"/>
+              </a:spcAft>
+              <a:buClr>
+                <a:schemeClr val="dk1"/>
+              </a:buClr>
+              <a:buSzPts val="275"/>
+              <a:buFont typeface="Arial"/>
+              <a:buNone/>
+            </a:pPr>
+            <a:r>
+              <a:rPr lang="en-US" sz="1250" dirty="0">
+                <a:solidFill>
+                  <a:schemeClr val="dk1"/>
+                </a:solidFill>
+              </a:rPr>
+              <a:t>        	   -/Home/Register</a:t>
+            </a:r>
+          </a:p>
+          <a:p>
+            <a:pPr marL="0" lvl="0" indent="0" algn="l" rtl="0">
+              <a:lnSpc>
+                <a:spcPct val="105000"/>
+              </a:lnSpc>
+              <a:spcBef>
+                <a:spcPts val="1200"/>
+              </a:spcBef>
+              <a:spcAft>
+                <a:spcPts val="0"/>
+              </a:spcAft>
+              <a:buClr>
+                <a:schemeClr val="dk1"/>
+              </a:buClr>
+              <a:buSzPts val="275"/>
+              <a:buFont typeface="Arial"/>
+              <a:buNone/>
+            </a:pPr>
+            <a:r>
+              <a:rPr lang="en-US" sz="1250">
+                <a:solidFill>
+                  <a:schemeClr val="dk1"/>
+                </a:solidFill>
+              </a:rPr>
+              <a:t>        	   -/Home/Contact-Us</a:t>
+            </a:r>
+            <a:endParaRPr sz="1250" dirty="0">
+              <a:solidFill>
+                <a:schemeClr val="dk1"/>
+              </a:solidFill>
+            </a:endParaRPr>
+          </a:p>
+        </p:txBody>
+      </p:sp>
+    </p:spTree>
+  </p:cSld>
+  <p:clrMapOvr>
+    <a:masterClrMapping/>
+  </p:clrMapOvr>
+</p:sld>
+</file>
+
+<file path=ppt/slides/slide11.xml><?xml version="1.0" encoding="utf-8"?>
+<p:sld xmlns:a="http://schemas.openxmlformats.org/drawingml/2006/main" xmlns:r="http://schemas.openxmlformats.org/officeDocument/2006/relationships" xmlns:p="http://schemas.openxmlformats.org/presentationml/2006/main">
+  <p:cSld>
+    <p:spTree>
+      <p:nvGrpSpPr>
         <p:cNvPr id="1" name="Shape 109"/>
         <p:cNvGrpSpPr/>
         <p:nvPr/>
@@ -6920,7 +7356,7 @@
 </p:sld>
 </file>
 
-<file path=ppt/slides/slide11.xml><?xml version="1.0" encoding="utf-8"?>
+<file path=ppt/slides/slide12.xml><?xml version="1.0" encoding="utf-8"?>
 <p:sld xmlns:a="http://schemas.openxmlformats.org/drawingml/2006/main" xmlns:r="http://schemas.openxmlformats.org/officeDocument/2006/relationships" xmlns:p="http://schemas.openxmlformats.org/presentationml/2006/main">
   <p:cSld>
     <p:spTree>
@@ -7751,6 +8187,36 @@
           </a:p>
         </p:txBody>
       </p:sp>
+      <p:pic>
+        <p:nvPicPr>
+          <p:cNvPr id="2" name="Picture 1">
+            <a:extLst>
+              <a:ext uri="{FF2B5EF4-FFF2-40B4-BE49-F238E27FC236}">
+                <a16:creationId xmlns:a16="http://schemas.microsoft.com/office/drawing/2014/main" id="{F7A5E71F-47CB-E5D5-8681-FAE17EA2275B}"/>
+              </a:ext>
+            </a:extLst>
+          </p:cNvPr>
+          <p:cNvPicPr>
+            <a:picLocks noChangeAspect="1"/>
+          </p:cNvPicPr>
+          <p:nvPr/>
+        </p:nvPicPr>
+        <p:blipFill>
+          <a:blip r:embed="rId3"/>
+          <a:stretch>
+            <a:fillRect/>
+          </a:stretch>
+        </p:blipFill>
+        <p:spPr>
+          <a:xfrm>
+            <a:off x="51163" y="1152475"/>
+            <a:ext cx="8954186" cy="3546000"/>
+          </a:xfrm>
+          <a:prstGeom prst="rect">
+            <a:avLst/>
+          </a:prstGeom>
+        </p:spPr>
+      </p:pic>
     </p:spTree>
   </p:cSld>
   <p:clrMapOvr>
@@ -7987,13 +8453,19 @@
               </a:spcAft>
               <a:buNone/>
             </a:pPr>
-            <a:endParaRPr/>
+            <a:endParaRPr dirty="0"/>
           </a:p>
         </p:txBody>
       </p:sp>
       <p:pic>
         <p:nvPicPr>
-          <p:cNvPr id="98" name="Google Shape;98;p20"/>
+          <p:cNvPr id="2" name="Google Shape;98;p20">
+            <a:extLst>
+              <a:ext uri="{FF2B5EF4-FFF2-40B4-BE49-F238E27FC236}">
+                <a16:creationId xmlns:a16="http://schemas.microsoft.com/office/drawing/2014/main" id="{E3E974B9-B117-43D1-0E28-0785CE5B7D55}"/>
+              </a:ext>
+            </a:extLst>
+          </p:cNvPr>
           <p:cNvPicPr preferRelativeResize="0"/>
           <p:nvPr/>
         </p:nvPicPr>
@@ -8007,36 +8479,8 @@
         </p:blipFill>
         <p:spPr>
           <a:xfrm>
-            <a:off x="235400" y="603175"/>
-            <a:ext cx="4882824" cy="2700801"/>
-          </a:xfrm>
-          <a:prstGeom prst="rect">
-            <a:avLst/>
-          </a:prstGeom>
-          <a:noFill/>
-          <a:ln>
-            <a:noFill/>
-          </a:ln>
-        </p:spPr>
-      </p:pic>
-      <p:pic>
-        <p:nvPicPr>
-          <p:cNvPr id="99" name="Google Shape;99;p20"/>
-          <p:cNvPicPr preferRelativeResize="0"/>
-          <p:nvPr/>
-        </p:nvPicPr>
-        <p:blipFill>
-          <a:blip r:embed="rId4">
-            <a:alphaModFix/>
-          </a:blip>
-          <a:stretch>
-            <a:fillRect/>
-          </a:stretch>
-        </p:blipFill>
-        <p:spPr>
-          <a:xfrm>
-            <a:off x="235400" y="3303973"/>
-            <a:ext cx="6370500" cy="1839525"/>
+            <a:off x="460917" y="869795"/>
+            <a:ext cx="8066049" cy="3888059"/>
           </a:xfrm>
           <a:prstGeom prst="rect">
             <a:avLst/>
@@ -8060,7 +8504,7 @@
   <p:cSld>
     <p:spTree>
       <p:nvGrpSpPr>
-        <p:cNvPr id="1" name="Shape 103"/>
+        <p:cNvPr id="1" name=""/>
         <p:cNvGrpSpPr/>
         <p:nvPr/>
       </p:nvGrpSpPr>
@@ -8074,457 +8518,97 @@
       </p:grpSpPr>
       <p:sp>
         <p:nvSpPr>
-          <p:cNvPr id="104" name="Google Shape;104;p21"/>
-          <p:cNvSpPr txBox="1">
+          <p:cNvPr id="2" name="Title 1">
+            <a:extLst>
+              <a:ext uri="{FF2B5EF4-FFF2-40B4-BE49-F238E27FC236}">
+                <a16:creationId xmlns:a16="http://schemas.microsoft.com/office/drawing/2014/main" id="{BBAE5423-B2A2-5D23-0EFB-6BDA5E695112}"/>
+              </a:ext>
+            </a:extLst>
+          </p:cNvPr>
+          <p:cNvSpPr>
             <a:spLocks noGrp="1"/>
           </p:cNvSpPr>
           <p:nvPr>
             <p:ph type="title"/>
           </p:nvPr>
         </p:nvSpPr>
-        <p:spPr>
-          <a:xfrm>
-            <a:off x="159125" y="96325"/>
-            <a:ext cx="8520600" cy="572700"/>
-          </a:xfrm>
-          <a:prstGeom prst="rect">
-            <a:avLst/>
-          </a:prstGeom>
-        </p:spPr>
+        <p:spPr/>
         <p:txBody>
-          <a:bodyPr spcFirstLastPara="1" wrap="square" lIns="91425" tIns="91425" rIns="91425" bIns="91425" anchor="t" anchorCtr="0">
+          <a:bodyPr>
             <a:normAutofit fontScale="90000"/>
           </a:bodyPr>
           <a:lstStyle/>
           <a:p>
-            <a:pPr marL="0" lvl="0" indent="0" algn="ctr" rtl="0">
-              <a:spcBef>
-                <a:spcPts val="0"/>
-              </a:spcBef>
-              <a:spcAft>
-                <a:spcPts val="0"/>
-              </a:spcAft>
-              <a:buNone/>
-            </a:pPr>
+            <a:pPr algn="ctr"/>
             <a:r>
-              <a:rPr lang="en-GB" u="sng"/>
-              <a:t>URLS</a:t>
+              <a:rPr lang="en-GB" u="sng" dirty="0"/>
+              <a:t>ER Diagram entity attributes and fields</a:t>
             </a:r>
-            <a:endParaRPr u="sng"/>
+            <a:endParaRPr lang="en-GB" dirty="0"/>
           </a:p>
         </p:txBody>
       </p:sp>
       <p:sp>
         <p:nvSpPr>
-          <p:cNvPr id="105" name="Google Shape;105;p21"/>
-          <p:cNvSpPr txBox="1">
+          <p:cNvPr id="3" name="Text Placeholder 2">
+            <a:extLst>
+              <a:ext uri="{FF2B5EF4-FFF2-40B4-BE49-F238E27FC236}">
+                <a16:creationId xmlns:a16="http://schemas.microsoft.com/office/drawing/2014/main" id="{1CF80AEC-7219-653F-1651-0D63CC94D40A}"/>
+              </a:ext>
+            </a:extLst>
+          </p:cNvPr>
+          <p:cNvSpPr>
             <a:spLocks noGrp="1"/>
           </p:cNvSpPr>
           <p:nvPr>
             <p:ph type="body" idx="1"/>
           </p:nvPr>
         </p:nvSpPr>
+        <p:spPr/>
+        <p:txBody>
+          <a:bodyPr/>
+          <a:lstStyle/>
+          <a:p>
+            <a:endParaRPr lang="en-GB" dirty="0"/>
+          </a:p>
+        </p:txBody>
+      </p:sp>
+      <p:pic>
+        <p:nvPicPr>
+          <p:cNvPr id="4" name="Picture 3">
+            <a:extLst>
+              <a:ext uri="{FF2B5EF4-FFF2-40B4-BE49-F238E27FC236}">
+                <a16:creationId xmlns:a16="http://schemas.microsoft.com/office/drawing/2014/main" id="{860D3A00-2A58-D0C9-5D02-29219629C22D}"/>
+              </a:ext>
+            </a:extLst>
+          </p:cNvPr>
+          <p:cNvPicPr>
+            <a:picLocks noChangeAspect="1"/>
+          </p:cNvPicPr>
+          <p:nvPr/>
+        </p:nvPicPr>
+        <p:blipFill>
+          <a:blip r:embed="rId2"/>
+          <a:stretch>
+            <a:fillRect/>
+          </a:stretch>
+        </p:blipFill>
         <p:spPr>
           <a:xfrm>
-            <a:off x="0" y="607600"/>
-            <a:ext cx="9054790" cy="4535900"/>
+            <a:off x="261167" y="1152475"/>
+            <a:ext cx="8571133" cy="3174198"/>
           </a:xfrm>
           <a:prstGeom prst="rect">
             <a:avLst/>
           </a:prstGeom>
         </p:spPr>
-        <p:txBody>
-          <a:bodyPr spcFirstLastPara="1" wrap="square" lIns="91425" tIns="91425" rIns="91425" bIns="91425" anchor="t" anchorCtr="0">
-            <a:noAutofit/>
-          </a:bodyPr>
-          <a:lstStyle/>
-          <a:p>
-            <a:pPr marL="0" lvl="0" indent="0" algn="l" rtl="0">
-              <a:lnSpc>
-                <a:spcPct val="105000"/>
-              </a:lnSpc>
-              <a:spcBef>
-                <a:spcPts val="1200"/>
-              </a:spcBef>
-              <a:spcAft>
-                <a:spcPts val="0"/>
-              </a:spcAft>
-              <a:buClr>
-                <a:schemeClr val="dk1"/>
-              </a:buClr>
-              <a:buSzPts val="275"/>
-              <a:buFont typeface="Arial"/>
-              <a:buNone/>
-            </a:pPr>
-            <a:r>
-              <a:rPr lang="en-GB" sz="1250" dirty="0">
-                <a:solidFill>
-                  <a:schemeClr val="dk1"/>
-                </a:solidFill>
-              </a:rPr>
-              <a:t>-/Home</a:t>
-            </a:r>
-            <a:endParaRPr sz="1250" dirty="0">
-              <a:solidFill>
-                <a:schemeClr val="dk1"/>
-              </a:solidFill>
-            </a:endParaRPr>
-          </a:p>
-          <a:p>
-            <a:pPr marL="0" lvl="0" indent="0" algn="l" rtl="0">
-              <a:lnSpc>
-                <a:spcPct val="105000"/>
-              </a:lnSpc>
-              <a:spcBef>
-                <a:spcPts val="1200"/>
-              </a:spcBef>
-              <a:spcAft>
-                <a:spcPts val="0"/>
-              </a:spcAft>
-              <a:buClr>
-                <a:schemeClr val="dk1"/>
-              </a:buClr>
-              <a:buSzPts val="275"/>
-              <a:buFont typeface="Arial"/>
-              <a:buNone/>
-            </a:pPr>
-            <a:r>
-              <a:rPr lang="en-GB" sz="1250" dirty="0">
-                <a:solidFill>
-                  <a:schemeClr val="dk1"/>
-                </a:solidFill>
-              </a:rPr>
-              <a:t>        	-/Home/Cars</a:t>
-            </a:r>
-            <a:endParaRPr sz="1250" dirty="0">
-              <a:solidFill>
-                <a:schemeClr val="dk1"/>
-              </a:solidFill>
-            </a:endParaRPr>
-          </a:p>
-          <a:p>
-            <a:pPr marL="0" lvl="0" indent="0" algn="l" rtl="0">
-              <a:lnSpc>
-                <a:spcPct val="105000"/>
-              </a:lnSpc>
-              <a:spcBef>
-                <a:spcPts val="1200"/>
-              </a:spcBef>
-              <a:spcAft>
-                <a:spcPts val="0"/>
-              </a:spcAft>
-              <a:buClr>
-                <a:schemeClr val="dk1"/>
-              </a:buClr>
-              <a:buSzPts val="275"/>
-              <a:buFont typeface="Arial"/>
-              <a:buNone/>
-            </a:pPr>
-            <a:r>
-              <a:rPr lang="en-GB" sz="1250" dirty="0">
-                <a:solidFill>
-                  <a:schemeClr val="dk1"/>
-                </a:solidFill>
-              </a:rPr>
-              <a:t>                    	    -/Home/Cars/New/</a:t>
-            </a:r>
-            <a:endParaRPr sz="1250" dirty="0">
-              <a:solidFill>
-                <a:schemeClr val="dk1"/>
-              </a:solidFill>
-            </a:endParaRPr>
-          </a:p>
-          <a:p>
-            <a:pPr marL="0" lvl="0" indent="0" algn="l" rtl="0">
-              <a:lnSpc>
-                <a:spcPct val="105000"/>
-              </a:lnSpc>
-              <a:spcBef>
-                <a:spcPts val="1200"/>
-              </a:spcBef>
-              <a:spcAft>
-                <a:spcPts val="0"/>
-              </a:spcAft>
-              <a:buClr>
-                <a:schemeClr val="dk1"/>
-              </a:buClr>
-              <a:buSzPts val="275"/>
-              <a:buFont typeface="Arial"/>
-              <a:buNone/>
-            </a:pPr>
-            <a:r>
-              <a:rPr lang="en-GB" sz="1250" dirty="0">
-                <a:solidFill>
-                  <a:schemeClr val="dk1"/>
-                </a:solidFill>
-              </a:rPr>
-              <a:t>                    	    - /Home/Cars/Used/</a:t>
-            </a:r>
-            <a:endParaRPr sz="1250" dirty="0">
-              <a:solidFill>
-                <a:schemeClr val="dk1"/>
-              </a:solidFill>
-            </a:endParaRPr>
-          </a:p>
-          <a:p>
-            <a:pPr marL="0" lvl="0" indent="0" algn="l" rtl="0">
-              <a:lnSpc>
-                <a:spcPct val="105000"/>
-              </a:lnSpc>
-              <a:spcBef>
-                <a:spcPts val="1200"/>
-              </a:spcBef>
-              <a:spcAft>
-                <a:spcPts val="0"/>
-              </a:spcAft>
-              <a:buClr>
-                <a:schemeClr val="dk1"/>
-              </a:buClr>
-              <a:buSzPts val="275"/>
-              <a:buFont typeface="Arial"/>
-              <a:buNone/>
-            </a:pPr>
-            <a:r>
-              <a:rPr lang="en-GB" sz="1250" dirty="0">
-                <a:solidFill>
-                  <a:schemeClr val="dk1"/>
-                </a:solidFill>
-              </a:rPr>
-              <a:t>        	-/Home/Sell-Cars            	</a:t>
-            </a:r>
-            <a:endParaRPr sz="1250" dirty="0">
-              <a:solidFill>
-                <a:schemeClr val="dk1"/>
-              </a:solidFill>
-            </a:endParaRPr>
-          </a:p>
-          <a:p>
-            <a:pPr marL="0" lvl="0" indent="0" algn="l" rtl="0">
-              <a:lnSpc>
-                <a:spcPct val="105000"/>
-              </a:lnSpc>
-              <a:spcBef>
-                <a:spcPts val="1200"/>
-              </a:spcBef>
-              <a:spcAft>
-                <a:spcPts val="0"/>
-              </a:spcAft>
-              <a:buClr>
-                <a:schemeClr val="dk1"/>
-              </a:buClr>
-              <a:buSzPts val="275"/>
-              <a:buFont typeface="Arial"/>
-              <a:buNone/>
-            </a:pPr>
-            <a:r>
-              <a:rPr lang="en-GB" sz="1250" dirty="0">
-                <a:solidFill>
-                  <a:schemeClr val="dk1"/>
-                </a:solidFill>
-              </a:rPr>
-              <a:t>                    		-/Home/Sell-Cars/Car-Upload</a:t>
-            </a:r>
-            <a:endParaRPr sz="1250" dirty="0">
-              <a:solidFill>
-                <a:schemeClr val="dk1"/>
-              </a:solidFill>
-            </a:endParaRPr>
-          </a:p>
-          <a:p>
-            <a:pPr marL="0" lvl="0" indent="0" algn="l" rtl="0">
-              <a:lnSpc>
-                <a:spcPct val="105000"/>
-              </a:lnSpc>
-              <a:spcBef>
-                <a:spcPts val="1200"/>
-              </a:spcBef>
-              <a:spcAft>
-                <a:spcPts val="0"/>
-              </a:spcAft>
-              <a:buClr>
-                <a:schemeClr val="dk1"/>
-              </a:buClr>
-              <a:buSzPts val="275"/>
-              <a:buFont typeface="Arial"/>
-              <a:buNone/>
-            </a:pPr>
-            <a:r>
-              <a:rPr lang="en-GB" sz="1250" dirty="0">
-                <a:solidFill>
-                  <a:schemeClr val="dk1"/>
-                </a:solidFill>
-              </a:rPr>
-              <a:t>                    	-/Home/Electric</a:t>
-            </a:r>
-            <a:endParaRPr sz="1250" dirty="0">
-              <a:solidFill>
-                <a:schemeClr val="dk1"/>
-              </a:solidFill>
-            </a:endParaRPr>
-          </a:p>
-          <a:p>
-            <a:pPr marL="0" lvl="0" indent="0" algn="l" rtl="0">
-              <a:lnSpc>
-                <a:spcPct val="105000"/>
-              </a:lnSpc>
-              <a:spcBef>
-                <a:spcPts val="1200"/>
-              </a:spcBef>
-              <a:spcAft>
-                <a:spcPts val="0"/>
-              </a:spcAft>
-              <a:buClr>
-                <a:schemeClr val="dk1"/>
-              </a:buClr>
-              <a:buSzPts val="275"/>
-              <a:buFont typeface="Arial"/>
-              <a:buNone/>
-            </a:pPr>
-            <a:r>
-              <a:rPr lang="en-GB" sz="1250" dirty="0">
-                <a:solidFill>
-                  <a:schemeClr val="dk1"/>
-                </a:solidFill>
-              </a:rPr>
-              <a:t>                    	-/Home/Cars/Car-Details</a:t>
-            </a:r>
-            <a:endParaRPr sz="1250" dirty="0">
-              <a:solidFill>
-                <a:schemeClr val="dk1"/>
-              </a:solidFill>
-            </a:endParaRPr>
-          </a:p>
-          <a:p>
-            <a:pPr marL="0" lvl="0" indent="0" algn="l" rtl="0">
-              <a:lnSpc>
-                <a:spcPct val="105000"/>
-              </a:lnSpc>
-              <a:spcBef>
-                <a:spcPts val="1200"/>
-              </a:spcBef>
-              <a:spcAft>
-                <a:spcPts val="0"/>
-              </a:spcAft>
-              <a:buClr>
-                <a:schemeClr val="dk1"/>
-              </a:buClr>
-              <a:buSzPts val="275"/>
-              <a:buFont typeface="Arial"/>
-              <a:buNone/>
-            </a:pPr>
-            <a:r>
-              <a:rPr lang="en-GB" sz="1250" dirty="0">
-                <a:solidFill>
-                  <a:schemeClr val="dk1"/>
-                </a:solidFill>
-              </a:rPr>
-              <a:t>                    	-/Home/Cars/Car-Brand</a:t>
-            </a:r>
-            <a:endParaRPr sz="1250" dirty="0">
-              <a:solidFill>
-                <a:schemeClr val="dk1"/>
-              </a:solidFill>
-            </a:endParaRPr>
-          </a:p>
-          <a:p>
-            <a:pPr marL="0" lvl="0" indent="0" algn="l" rtl="0">
-              <a:lnSpc>
-                <a:spcPct val="105000"/>
-              </a:lnSpc>
-              <a:spcBef>
-                <a:spcPts val="1200"/>
-              </a:spcBef>
-              <a:spcAft>
-                <a:spcPts val="0"/>
-              </a:spcAft>
-              <a:buClr>
-                <a:schemeClr val="dk1"/>
-              </a:buClr>
-              <a:buSzPts val="275"/>
-              <a:buFont typeface="Arial"/>
-              <a:buNone/>
-            </a:pPr>
-            <a:r>
-              <a:rPr lang="en-GB" sz="1250" dirty="0">
-                <a:solidFill>
-                  <a:schemeClr val="dk1"/>
-                </a:solidFill>
-              </a:rPr>
-              <a:t>        	-/Home/Login</a:t>
-            </a:r>
-            <a:endParaRPr sz="1250" dirty="0">
-              <a:solidFill>
-                <a:schemeClr val="dk1"/>
-              </a:solidFill>
-            </a:endParaRPr>
-          </a:p>
-          <a:p>
-            <a:pPr marL="0" lvl="0" indent="0" algn="l" rtl="0">
-              <a:lnSpc>
-                <a:spcPct val="105000"/>
-              </a:lnSpc>
-              <a:spcBef>
-                <a:spcPts val="1200"/>
-              </a:spcBef>
-              <a:spcAft>
-                <a:spcPts val="0"/>
-              </a:spcAft>
-              <a:buClr>
-                <a:schemeClr val="dk1"/>
-              </a:buClr>
-              <a:buSzPts val="275"/>
-              <a:buFont typeface="Arial"/>
-              <a:buNone/>
-            </a:pPr>
-            <a:r>
-              <a:rPr lang="en-GB" sz="1250" dirty="0">
-                <a:solidFill>
-                  <a:schemeClr val="dk1"/>
-                </a:solidFill>
-              </a:rPr>
-              <a:t>        	-/Home/Register</a:t>
-            </a:r>
-            <a:endParaRPr sz="1250" dirty="0">
-              <a:solidFill>
-                <a:schemeClr val="dk1"/>
-              </a:solidFill>
-            </a:endParaRPr>
-          </a:p>
-          <a:p>
-            <a:pPr marL="0" lvl="0" indent="0" algn="l" rtl="0">
-              <a:lnSpc>
-                <a:spcPct val="105000"/>
-              </a:lnSpc>
-              <a:spcBef>
-                <a:spcPts val="1200"/>
-              </a:spcBef>
-              <a:spcAft>
-                <a:spcPts val="0"/>
-              </a:spcAft>
-              <a:buClr>
-                <a:schemeClr val="dk1"/>
-              </a:buClr>
-              <a:buSzPts val="275"/>
-              <a:buFont typeface="Arial"/>
-              <a:buNone/>
-            </a:pPr>
-            <a:r>
-              <a:rPr lang="en-GB" sz="1250" dirty="0">
-                <a:solidFill>
-                  <a:schemeClr val="dk1"/>
-                </a:solidFill>
-              </a:rPr>
-              <a:t>        	-/Home/Contact-Us</a:t>
-            </a:r>
-            <a:endParaRPr sz="1250" dirty="0">
-              <a:solidFill>
-                <a:schemeClr val="dk1"/>
-              </a:solidFill>
-            </a:endParaRPr>
-          </a:p>
-        </p:txBody>
-      </p:sp>
+      </p:pic>
     </p:spTree>
+    <p:extLst>
+      <p:ext uri="{BB962C8B-B14F-4D97-AF65-F5344CB8AC3E}">
+        <p14:creationId xmlns:p14="http://schemas.microsoft.com/office/powerpoint/2010/main" val="231233261"/>
+      </p:ext>
+    </p:extLst>
   </p:cSld>
   <p:clrMapOvr>
     <a:masterClrMapping/>

</xml_diff>

<commit_message>
Done with ER, system architecture, urls, overview, add rest
</commit_message>
<xml_diff>
--- a/Design Specification.pptx
+++ b/Design Specification.pptx
@@ -6996,7 +6996,7 @@
                   <a:schemeClr val="dk1"/>
                 </a:solidFill>
               </a:rPr>
-              <a:t>                    	    -/Home/Electric</a:t>
+              <a:t>                    	    -/Home/Cars/Electric</a:t>
             </a:r>
           </a:p>
           <a:p>
@@ -7126,7 +7126,7 @@
               <a:buNone/>
             </a:pPr>
             <a:r>
-              <a:rPr lang="en-US" sz="1250">
+              <a:rPr lang="en-US" sz="1250" dirty="0">
                 <a:solidFill>
                   <a:schemeClr val="dk1"/>
                 </a:solidFill>

</xml_diff>

<commit_message>
added personas, polished requirements
</commit_message>
<xml_diff>
--- a/Design Specification.pptx
+++ b/Design Specification.pptx
@@ -13,10 +13,10 @@
     <p:sldId id="258" r:id="rId4"/>
     <p:sldId id="259" r:id="rId5"/>
     <p:sldId id="260" r:id="rId6"/>
-    <p:sldId id="261" r:id="rId7"/>
-    <p:sldId id="262" r:id="rId8"/>
-    <p:sldId id="263" r:id="rId9"/>
-    <p:sldId id="267" r:id="rId10"/>
+    <p:sldId id="267" r:id="rId7"/>
+    <p:sldId id="261" r:id="rId8"/>
+    <p:sldId id="262" r:id="rId9"/>
+    <p:sldId id="263" r:id="rId10"/>
     <p:sldId id="264" r:id="rId11"/>
     <p:sldId id="265" r:id="rId12"/>
     <p:sldId id="266" r:id="rId13"/>
@@ -821,6 +821,110 @@
   <p:cSld>
     <p:spTree>
       <p:nvGrpSpPr>
+        <p:cNvPr id="1" name="Shape 100"/>
+        <p:cNvGrpSpPr/>
+        <p:nvPr/>
+      </p:nvGrpSpPr>
+      <p:grpSpPr>
+        <a:xfrm>
+          <a:off x="0" y="0"/>
+          <a:ext cx="0" cy="0"/>
+          <a:chOff x="0" y="0"/>
+          <a:chExt cx="0" cy="0"/>
+        </a:xfrm>
+      </p:grpSpPr>
+      <p:sp>
+        <p:nvSpPr>
+          <p:cNvPr id="101" name="Google Shape;101;g21016290f93_0_37:notes"/>
+          <p:cNvSpPr>
+            <a:spLocks noGrp="1" noRot="1" noChangeAspect="1"/>
+          </p:cNvSpPr>
+          <p:nvPr>
+            <p:ph type="sldImg" idx="2"/>
+          </p:nvPr>
+        </p:nvSpPr>
+        <p:spPr>
+          <a:xfrm>
+            <a:off x="381000" y="685800"/>
+            <a:ext cx="6096000" cy="3429000"/>
+          </a:xfrm>
+          <a:custGeom>
+            <a:avLst/>
+            <a:gdLst/>
+            <a:ahLst/>
+            <a:cxnLst/>
+            <a:rect l="l" t="t" r="r" b="b"/>
+            <a:pathLst>
+              <a:path w="120000" h="120000" extrusionOk="0">
+                <a:moveTo>
+                  <a:pt x="0" y="0"/>
+                </a:moveTo>
+                <a:lnTo>
+                  <a:pt x="120000" y="0"/>
+                </a:lnTo>
+                <a:lnTo>
+                  <a:pt x="120000" y="120000"/>
+                </a:lnTo>
+                <a:lnTo>
+                  <a:pt x="0" y="120000"/>
+                </a:lnTo>
+                <a:close/>
+              </a:path>
+            </a:pathLst>
+          </a:custGeom>
+        </p:spPr>
+      </p:sp>
+      <p:sp>
+        <p:nvSpPr>
+          <p:cNvPr id="102" name="Google Shape;102;g21016290f93_0_37:notes"/>
+          <p:cNvSpPr txBox="1">
+            <a:spLocks noGrp="1"/>
+          </p:cNvSpPr>
+          <p:nvPr>
+            <p:ph type="body" idx="1"/>
+          </p:nvPr>
+        </p:nvSpPr>
+        <p:spPr>
+          <a:xfrm>
+            <a:off x="685800" y="4343400"/>
+            <a:ext cx="5486400" cy="4114800"/>
+          </a:xfrm>
+          <a:prstGeom prst="rect">
+            <a:avLst/>
+          </a:prstGeom>
+        </p:spPr>
+        <p:txBody>
+          <a:bodyPr spcFirstLastPara="1" wrap="square" lIns="91425" tIns="91425" rIns="91425" bIns="91425" anchor="t" anchorCtr="0">
+            <a:noAutofit/>
+          </a:bodyPr>
+          <a:lstStyle/>
+          <a:p>
+            <a:pPr marL="0" lvl="0" indent="0" algn="l" rtl="0">
+              <a:spcBef>
+                <a:spcPts val="0"/>
+              </a:spcBef>
+              <a:spcAft>
+                <a:spcPts val="0"/>
+              </a:spcAft>
+              <a:buNone/>
+            </a:pPr>
+            <a:endParaRPr/>
+          </a:p>
+        </p:txBody>
+      </p:sp>
+    </p:spTree>
+  </p:cSld>
+  <p:clrMapOvr>
+    <a:masterClrMapping/>
+  </p:clrMapOvr>
+</p:notes>
+</file>
+
+<file path=ppt/notesSlides/notesSlide11.xml><?xml version="1.0" encoding="utf-8"?>
+<p:notes xmlns:a="http://schemas.openxmlformats.org/drawingml/2006/main" xmlns:r="http://schemas.openxmlformats.org/officeDocument/2006/relationships" xmlns:p="http://schemas.openxmlformats.org/presentationml/2006/main" showMasterSp="0" showMasterPhAnim="0">
+  <p:cSld>
+    <p:spTree>
+      <p:nvGrpSpPr>
         <p:cNvPr id="1" name="Shape 106"/>
         <p:cNvGrpSpPr/>
         <p:nvPr/>
@@ -920,7 +1024,7 @@
 </p:notes>
 </file>
 
-<file path=ppt/notesSlides/notesSlide11.xml><?xml version="1.0" encoding="utf-8"?>
+<file path=ppt/notesSlides/notesSlide12.xml><?xml version="1.0" encoding="utf-8"?>
 <p:notes xmlns:a="http://schemas.openxmlformats.org/drawingml/2006/main" xmlns:r="http://schemas.openxmlformats.org/officeDocument/2006/relationships" xmlns:p="http://schemas.openxmlformats.org/presentationml/2006/main" showMasterSp="0" showMasterPhAnim="0">
   <p:cSld>
     <p:spTree>
@@ -1261,7 +1365,7 @@
         </p:nvSpPr>
         <p:spPr>
           <a:xfrm>
-            <a:off x="381300" y="685800"/>
+            <a:off x="381000" y="685800"/>
             <a:ext cx="6096000" cy="3429000"/>
           </a:xfrm>
           <a:custGeom>
@@ -1365,7 +1469,7 @@
         </p:nvSpPr>
         <p:spPr>
           <a:xfrm>
-            <a:off x="381300" y="685800"/>
+            <a:off x="381000" y="685800"/>
             <a:ext cx="6096000" cy="3429000"/>
           </a:xfrm>
           <a:custGeom>
@@ -1441,6 +1545,115 @@
 </file>
 
 <file path=ppt/notesSlides/notesSlide6.xml><?xml version="1.0" encoding="utf-8"?>
+<p:notes xmlns:a="http://schemas.openxmlformats.org/drawingml/2006/main" xmlns:r="http://schemas.openxmlformats.org/officeDocument/2006/relationships" xmlns:p="http://schemas.openxmlformats.org/presentationml/2006/main" showMasterSp="0" showMasterPhAnim="0">
+  <p:cSld>
+    <p:spTree>
+      <p:nvGrpSpPr>
+        <p:cNvPr id="1" name="Shape 74"/>
+        <p:cNvGrpSpPr/>
+        <p:nvPr/>
+      </p:nvGrpSpPr>
+      <p:grpSpPr>
+        <a:xfrm>
+          <a:off x="0" y="0"/>
+          <a:ext cx="0" cy="0"/>
+          <a:chOff x="0" y="0"/>
+          <a:chExt cx="0" cy="0"/>
+        </a:xfrm>
+      </p:grpSpPr>
+      <p:sp>
+        <p:nvSpPr>
+          <p:cNvPr id="75" name="Google Shape;75;g21016290f93_0_15:notes"/>
+          <p:cNvSpPr>
+            <a:spLocks noGrp="1" noRot="1" noChangeAspect="1"/>
+          </p:cNvSpPr>
+          <p:nvPr>
+            <p:ph type="sldImg" idx="2"/>
+          </p:nvPr>
+        </p:nvSpPr>
+        <p:spPr>
+          <a:xfrm>
+            <a:off x="381000" y="685800"/>
+            <a:ext cx="6096000" cy="3429000"/>
+          </a:xfrm>
+          <a:custGeom>
+            <a:avLst/>
+            <a:gdLst/>
+            <a:ahLst/>
+            <a:cxnLst/>
+            <a:rect l="l" t="t" r="r" b="b"/>
+            <a:pathLst>
+              <a:path w="120000" h="120000" extrusionOk="0">
+                <a:moveTo>
+                  <a:pt x="0" y="0"/>
+                </a:moveTo>
+                <a:lnTo>
+                  <a:pt x="120000" y="0"/>
+                </a:lnTo>
+                <a:lnTo>
+                  <a:pt x="120000" y="120000"/>
+                </a:lnTo>
+                <a:lnTo>
+                  <a:pt x="0" y="120000"/>
+                </a:lnTo>
+                <a:close/>
+              </a:path>
+            </a:pathLst>
+          </a:custGeom>
+        </p:spPr>
+      </p:sp>
+      <p:sp>
+        <p:nvSpPr>
+          <p:cNvPr id="76" name="Google Shape;76;g21016290f93_0_15:notes"/>
+          <p:cNvSpPr txBox="1">
+            <a:spLocks noGrp="1"/>
+          </p:cNvSpPr>
+          <p:nvPr>
+            <p:ph type="body" idx="1"/>
+          </p:nvPr>
+        </p:nvSpPr>
+        <p:spPr>
+          <a:xfrm>
+            <a:off x="685800" y="4343400"/>
+            <a:ext cx="5486400" cy="4114800"/>
+          </a:xfrm>
+          <a:prstGeom prst="rect">
+            <a:avLst/>
+          </a:prstGeom>
+        </p:spPr>
+        <p:txBody>
+          <a:bodyPr spcFirstLastPara="1" wrap="square" lIns="91425" tIns="91425" rIns="91425" bIns="91425" anchor="t" anchorCtr="0">
+            <a:noAutofit/>
+          </a:bodyPr>
+          <a:lstStyle/>
+          <a:p>
+            <a:pPr marL="0" lvl="0" indent="0" algn="l" rtl="0">
+              <a:spcBef>
+                <a:spcPts val="0"/>
+              </a:spcBef>
+              <a:spcAft>
+                <a:spcPts val="0"/>
+              </a:spcAft>
+              <a:buNone/>
+            </a:pPr>
+            <a:endParaRPr/>
+          </a:p>
+        </p:txBody>
+      </p:sp>
+    </p:spTree>
+    <p:extLst>
+      <p:ext uri="{BB962C8B-B14F-4D97-AF65-F5344CB8AC3E}">
+        <p14:creationId xmlns:p14="http://schemas.microsoft.com/office/powerpoint/2010/main" val="3745091258"/>
+      </p:ext>
+    </p:extLst>
+  </p:cSld>
+  <p:clrMapOvr>
+    <a:masterClrMapping/>
+  </p:clrMapOvr>
+</p:notes>
+</file>
+
+<file path=ppt/notesSlides/notesSlide7.xml><?xml version="1.0" encoding="utf-8"?>
 <p:notes xmlns:a="http://schemas.openxmlformats.org/drawingml/2006/main" xmlns:r="http://schemas.openxmlformats.org/officeDocument/2006/relationships" xmlns:p="http://schemas.openxmlformats.org/presentationml/2006/main" showMasterSp="0" showMasterPhAnim="0">
   <p:cSld>
     <p:spTree>
@@ -1544,7 +1757,7 @@
 </p:notes>
 </file>
 
-<file path=ppt/notesSlides/notesSlide7.xml><?xml version="1.0" encoding="utf-8"?>
+<file path=ppt/notesSlides/notesSlide8.xml><?xml version="1.0" encoding="utf-8"?>
 <p:notes xmlns:a="http://schemas.openxmlformats.org/drawingml/2006/main" xmlns:r="http://schemas.openxmlformats.org/officeDocument/2006/relationships" xmlns:p="http://schemas.openxmlformats.org/presentationml/2006/main" showMasterSp="0" showMasterPhAnim="0">
   <p:cSld>
     <p:spTree>
@@ -1648,7 +1861,7 @@
 </p:notes>
 </file>
 
-<file path=ppt/notesSlides/notesSlide8.xml><?xml version="1.0" encoding="utf-8"?>
+<file path=ppt/notesSlides/notesSlide9.xml><?xml version="1.0" encoding="utf-8"?>
 <p:notes xmlns:a="http://schemas.openxmlformats.org/drawingml/2006/main" xmlns:r="http://schemas.openxmlformats.org/officeDocument/2006/relationships" xmlns:p="http://schemas.openxmlformats.org/presentationml/2006/main" showMasterSp="0" showMasterPhAnim="0">
   <p:cSld>
     <p:spTree>
@@ -1677,7 +1890,7 @@
         </p:nvSpPr>
         <p:spPr>
           <a:xfrm>
-            <a:off x="381000" y="685800"/>
+            <a:off x="381300" y="685800"/>
             <a:ext cx="6096000" cy="3429000"/>
           </a:xfrm>
           <a:custGeom>
@@ -1709,110 +1922,6 @@
       <p:sp>
         <p:nvSpPr>
           <p:cNvPr id="94" name="Google Shape;94;g21016290f93_0_30:notes"/>
-          <p:cNvSpPr txBox="1">
-            <a:spLocks noGrp="1"/>
-          </p:cNvSpPr>
-          <p:nvPr>
-            <p:ph type="body" idx="1"/>
-          </p:nvPr>
-        </p:nvSpPr>
-        <p:spPr>
-          <a:xfrm>
-            <a:off x="685800" y="4343400"/>
-            <a:ext cx="5486400" cy="4114800"/>
-          </a:xfrm>
-          <a:prstGeom prst="rect">
-            <a:avLst/>
-          </a:prstGeom>
-        </p:spPr>
-        <p:txBody>
-          <a:bodyPr spcFirstLastPara="1" wrap="square" lIns="91425" tIns="91425" rIns="91425" bIns="91425" anchor="t" anchorCtr="0">
-            <a:noAutofit/>
-          </a:bodyPr>
-          <a:lstStyle/>
-          <a:p>
-            <a:pPr marL="0" lvl="0" indent="0" algn="l" rtl="0">
-              <a:spcBef>
-                <a:spcPts val="0"/>
-              </a:spcBef>
-              <a:spcAft>
-                <a:spcPts val="0"/>
-              </a:spcAft>
-              <a:buNone/>
-            </a:pPr>
-            <a:endParaRPr/>
-          </a:p>
-        </p:txBody>
-      </p:sp>
-    </p:spTree>
-  </p:cSld>
-  <p:clrMapOvr>
-    <a:masterClrMapping/>
-  </p:clrMapOvr>
-</p:notes>
-</file>
-
-<file path=ppt/notesSlides/notesSlide9.xml><?xml version="1.0" encoding="utf-8"?>
-<p:notes xmlns:a="http://schemas.openxmlformats.org/drawingml/2006/main" xmlns:r="http://schemas.openxmlformats.org/officeDocument/2006/relationships" xmlns:p="http://schemas.openxmlformats.org/presentationml/2006/main" showMasterSp="0" showMasterPhAnim="0">
-  <p:cSld>
-    <p:spTree>
-      <p:nvGrpSpPr>
-        <p:cNvPr id="1" name="Shape 100"/>
-        <p:cNvGrpSpPr/>
-        <p:nvPr/>
-      </p:nvGrpSpPr>
-      <p:grpSpPr>
-        <a:xfrm>
-          <a:off x="0" y="0"/>
-          <a:ext cx="0" cy="0"/>
-          <a:chOff x="0" y="0"/>
-          <a:chExt cx="0" cy="0"/>
-        </a:xfrm>
-      </p:grpSpPr>
-      <p:sp>
-        <p:nvSpPr>
-          <p:cNvPr id="101" name="Google Shape;101;g21016290f93_0_37:notes"/>
-          <p:cNvSpPr>
-            <a:spLocks noGrp="1" noRot="1" noChangeAspect="1"/>
-          </p:cNvSpPr>
-          <p:nvPr>
-            <p:ph type="sldImg" idx="2"/>
-          </p:nvPr>
-        </p:nvSpPr>
-        <p:spPr>
-          <a:xfrm>
-            <a:off x="381000" y="685800"/>
-            <a:ext cx="6096000" cy="3429000"/>
-          </a:xfrm>
-          <a:custGeom>
-            <a:avLst/>
-            <a:gdLst/>
-            <a:ahLst/>
-            <a:cxnLst/>
-            <a:rect l="l" t="t" r="r" b="b"/>
-            <a:pathLst>
-              <a:path w="120000" h="120000" extrusionOk="0">
-                <a:moveTo>
-                  <a:pt x="0" y="0"/>
-                </a:moveTo>
-                <a:lnTo>
-                  <a:pt x="120000" y="0"/>
-                </a:lnTo>
-                <a:lnTo>
-                  <a:pt x="120000" y="120000"/>
-                </a:lnTo>
-                <a:lnTo>
-                  <a:pt x="0" y="120000"/>
-                </a:lnTo>
-                <a:close/>
-              </a:path>
-            </a:pathLst>
-          </a:custGeom>
-        </p:spPr>
-      </p:sp>
-      <p:sp>
-        <p:nvSpPr>
-          <p:cNvPr id="102" name="Google Shape;102;g21016290f93_0_37:notes"/>
           <p:cNvSpPr txBox="1">
             <a:spLocks noGrp="1"/>
           </p:cNvSpPr>
@@ -6853,16 +6962,13 @@
                   <a:schemeClr val="dk1"/>
                 </a:solidFill>
               </a:rPr>
-              <a:t>        	</a:t>
+              <a:t>        	-/Home/Cars</a:t>
             </a:r>
-            <a:r>
-              <a:rPr lang="en-US" sz="1250" dirty="0">
-                <a:solidFill>
-                  <a:schemeClr val="dk1"/>
-                </a:solidFill>
-              </a:rPr>
-              <a:t> -/Home/Cars</a:t>
-            </a:r>
+            <a:endParaRPr sz="1250" dirty="0">
+              <a:solidFill>
+                <a:schemeClr val="dk1"/>
+              </a:solidFill>
+            </a:endParaRPr>
           </a:p>
           <a:p>
             <a:pPr marL="0" lvl="0" indent="0" algn="l" rtl="0">
@@ -6883,13 +6989,18 @@
               <a:buNone/>
             </a:pPr>
             <a:r>
-              <a:rPr lang="en-US" sz="1250" dirty="0">
+              <a:rPr lang="en-GB" sz="1250" dirty="0">
                 <a:solidFill>
                   <a:schemeClr val="dk1"/>
                 </a:solidFill>
               </a:rPr>
-              <a:t>                    	    -/Home/Cars/New</a:t>
+              <a:t>                    	    -/Home/Cars/New/</a:t>
             </a:r>
+            <a:endParaRPr sz="1250" dirty="0">
+              <a:solidFill>
+                <a:schemeClr val="dk1"/>
+              </a:solidFill>
+            </a:endParaRPr>
           </a:p>
           <a:p>
             <a:pPr marL="0" lvl="0" indent="0" algn="l" rtl="0">
@@ -6910,13 +7021,18 @@
               <a:buNone/>
             </a:pPr>
             <a:r>
-              <a:rPr lang="en-US" sz="1250" dirty="0">
+              <a:rPr lang="en-GB" sz="1250" dirty="0">
                 <a:solidFill>
                   <a:schemeClr val="dk1"/>
                 </a:solidFill>
               </a:rPr>
-              <a:t>                    	    - /Home/Cars/Used</a:t>
+              <a:t>                    	    - /Home/Cars/Used/</a:t>
             </a:r>
+            <a:endParaRPr sz="1250" dirty="0">
+              <a:solidFill>
+                <a:schemeClr val="dk1"/>
+              </a:solidFill>
+            </a:endParaRPr>
           </a:p>
           <a:p>
             <a:pPr marL="0" lvl="0" indent="0" algn="l" rtl="0">
@@ -6937,13 +7053,18 @@
               <a:buNone/>
             </a:pPr>
             <a:r>
-              <a:rPr lang="en-US" sz="1250" dirty="0">
+              <a:rPr lang="en-GB" sz="1250" dirty="0">
                 <a:solidFill>
                   <a:schemeClr val="dk1"/>
                 </a:solidFill>
               </a:rPr>
-              <a:t>        	    -/Home/Cars/Sell-My-Car            	</a:t>
+              <a:t>        	-/Home/Sell-Cars            	</a:t>
             </a:r>
+            <a:endParaRPr sz="1250" dirty="0">
+              <a:solidFill>
+                <a:schemeClr val="dk1"/>
+              </a:solidFill>
+            </a:endParaRPr>
           </a:p>
           <a:p>
             <a:pPr marL="0" lvl="0" indent="0" algn="l" rtl="0">
@@ -6964,13 +7085,18 @@
               <a:buNone/>
             </a:pPr>
             <a:r>
-              <a:rPr lang="en-US" sz="1250" dirty="0">
+              <a:rPr lang="en-GB" sz="1250" dirty="0">
                 <a:solidFill>
                   <a:schemeClr val="dk1"/>
                 </a:solidFill>
               </a:rPr>
               <a:t>                    		-/Home/Sell-Cars/Car-Upload</a:t>
             </a:r>
+            <a:endParaRPr sz="1250" dirty="0">
+              <a:solidFill>
+                <a:schemeClr val="dk1"/>
+              </a:solidFill>
+            </a:endParaRPr>
           </a:p>
           <a:p>
             <a:pPr marL="0" lvl="0" indent="0" algn="l" rtl="0">
@@ -6991,13 +7117,18 @@
               <a:buNone/>
             </a:pPr>
             <a:r>
-              <a:rPr lang="en-US" sz="1250" dirty="0">
+              <a:rPr lang="en-GB" sz="1250" dirty="0">
                 <a:solidFill>
                   <a:schemeClr val="dk1"/>
                 </a:solidFill>
               </a:rPr>
-              <a:t>                    	    -/Home/Cars/Electric</a:t>
+              <a:t>                    	-/Home/Electric</a:t>
             </a:r>
+            <a:endParaRPr sz="1250" dirty="0">
+              <a:solidFill>
+                <a:schemeClr val="dk1"/>
+              </a:solidFill>
+            </a:endParaRPr>
           </a:p>
           <a:p>
             <a:pPr marL="0" lvl="0" indent="0" algn="l" rtl="0">
@@ -7018,13 +7149,18 @@
               <a:buNone/>
             </a:pPr>
             <a:r>
-              <a:rPr lang="en-US" sz="1250" dirty="0">
+              <a:rPr lang="en-GB" sz="1250" dirty="0">
                 <a:solidFill>
                   <a:schemeClr val="dk1"/>
                 </a:solidFill>
               </a:rPr>
-              <a:t>                   	    -/Home/Cars/Car-Details</a:t>
+              <a:t>                    	-/Home/Cars/Car-Details</a:t>
             </a:r>
+            <a:endParaRPr sz="1250" dirty="0">
+              <a:solidFill>
+                <a:schemeClr val="dk1"/>
+              </a:solidFill>
+            </a:endParaRPr>
           </a:p>
           <a:p>
             <a:pPr marL="0" lvl="0" indent="0" algn="l" rtl="0">
@@ -7045,13 +7181,18 @@
               <a:buNone/>
             </a:pPr>
             <a:r>
-              <a:rPr lang="en-US" sz="1250" dirty="0">
+              <a:rPr lang="en-GB" sz="1250" dirty="0">
                 <a:solidFill>
                   <a:schemeClr val="dk1"/>
                 </a:solidFill>
               </a:rPr>
-              <a:t>                    	    -/Home/Cars/Car-Brand</a:t>
+              <a:t>                    	-/Home/Cars/Car-Brand</a:t>
             </a:r>
+            <a:endParaRPr sz="1250" dirty="0">
+              <a:solidFill>
+                <a:schemeClr val="dk1"/>
+              </a:solidFill>
+            </a:endParaRPr>
           </a:p>
           <a:p>
             <a:pPr marL="0" lvl="0" indent="0" algn="l" rtl="0">
@@ -7072,13 +7213,18 @@
               <a:buNone/>
             </a:pPr>
             <a:r>
-              <a:rPr lang="en-US" sz="1250" dirty="0">
+              <a:rPr lang="en-GB" sz="1250" dirty="0">
                 <a:solidFill>
                   <a:schemeClr val="dk1"/>
                 </a:solidFill>
               </a:rPr>
-              <a:t>        	    -/Home/Log-In</a:t>
+              <a:t>        	-/Home/Login</a:t>
             </a:r>
+            <a:endParaRPr sz="1250" dirty="0">
+              <a:solidFill>
+                <a:schemeClr val="dk1"/>
+              </a:solidFill>
+            </a:endParaRPr>
           </a:p>
           <a:p>
             <a:pPr marL="0" lvl="0" indent="0" algn="l" rtl="0">
@@ -7099,13 +7245,18 @@
               <a:buNone/>
             </a:pPr>
             <a:r>
-              <a:rPr lang="en-US" sz="1250" dirty="0">
+              <a:rPr lang="en-GB" sz="1250" dirty="0">
                 <a:solidFill>
                   <a:schemeClr val="dk1"/>
                 </a:solidFill>
               </a:rPr>
-              <a:t>        	   -/Home/Register</a:t>
+              <a:t>        	-/Home/Register</a:t>
             </a:r>
+            <a:endParaRPr sz="1250" dirty="0">
+              <a:solidFill>
+                <a:schemeClr val="dk1"/>
+              </a:solidFill>
+            </a:endParaRPr>
           </a:p>
           <a:p>
             <a:pPr marL="0" lvl="0" indent="0" algn="l" rtl="0">
@@ -7126,12 +7277,12 @@
               <a:buNone/>
             </a:pPr>
             <a:r>
-              <a:rPr lang="en-US" sz="1250" dirty="0">
+              <a:rPr lang="en-GB" sz="1250" dirty="0">
                 <a:solidFill>
                   <a:schemeClr val="dk1"/>
                 </a:solidFill>
               </a:rPr>
-              <a:t>        	   -/Home/Contact-Us</a:t>
+              <a:t>        	-/Home/Contact-Us</a:t>
             </a:r>
             <a:endParaRPr sz="1250" dirty="0">
               <a:solidFill>
@@ -7513,10 +7664,10 @@
               <a:buNone/>
             </a:pPr>
             <a:r>
-              <a:rPr lang="en-GB" u="sng"/>
-              <a:t>Team 4D - Car Website </a:t>
+              <a:rPr lang="en-GB" u="sng" dirty="0"/>
+              <a:t>Team 4D - Car Marketplace </a:t>
             </a:r>
-            <a:endParaRPr u="sng"/>
+            <a:endParaRPr u="sng" dirty="0"/>
           </a:p>
         </p:txBody>
       </p:sp>
@@ -7541,56 +7692,69 @@
         </p:spPr>
         <p:txBody>
           <a:bodyPr spcFirstLastPara="1" wrap="square" lIns="91425" tIns="91425" rIns="91425" bIns="91425" anchor="t" anchorCtr="0">
-            <a:normAutofit lnSpcReduction="10000"/>
+            <a:normAutofit/>
           </a:bodyPr>
           <a:lstStyle/>
           <a:p>
-            <a:pPr marL="0" lvl="0" indent="0" algn="l" rtl="0">
-              <a:spcBef>
-                <a:spcPts val="0"/>
-              </a:spcBef>
-              <a:spcAft>
-                <a:spcPts val="0"/>
-              </a:spcAft>
-              <a:buNone/>
+            <a:pPr marL="285750" indent="-285750">
+              <a:spcAft>
+                <a:spcPts val="1200"/>
+              </a:spcAft>
             </a:pPr>
             <a:r>
-              <a:rPr lang="en-GB" dirty="0"/>
-              <a:t>The aim of our website is to give sellers a market to sell their cars for the right prices and so the users can interact with such sellers and find their best budget car or dream car. </a:t>
+              <a:rPr lang="en-GB" dirty="0">
+                <a:solidFill>
+                  <a:schemeClr val="tx1"/>
+                </a:solidFill>
+                <a:latin typeface="+mn-lt"/>
+              </a:rPr>
+              <a:t>Goal: building an intuitive yet extensive marketplace to aid car sales for the right prices and help people make their dream purchase.</a:t>
             </a:r>
-            <a:endParaRPr dirty="0"/>
-          </a:p>
-          <a:p>
-            <a:pPr marL="0" lvl="0" indent="0" algn="l" rtl="0">
-              <a:spcBef>
+          </a:p>
+          <a:p>
+            <a:pPr marL="285750" indent="-285750">
+              <a:spcAft>
                 <a:spcPts val="1200"/>
-              </a:spcBef>
-              <a:spcAft>
-                <a:spcPts val="0"/>
-              </a:spcAft>
-              <a:buNone/>
+              </a:spcAft>
             </a:pPr>
             <a:r>
-              <a:rPr lang="en-GB" dirty="0"/>
-              <a:t>The user can be a buyer if they choose to. But to be a seller the user must create an account. The user can search for cars and use the filter bar to filter for specific cars. The user can also upload and sell cars. The user can also post reviews on specific cars. If a user wants to buy a car, they can message the seller, however they have to have an account before the user can proceed as such.</a:t>
+              <a:rPr lang="en-GB" dirty="0">
+                <a:solidFill>
+                  <a:schemeClr val="tx1"/>
+                </a:solidFill>
+                <a:latin typeface="+mn-lt"/>
+              </a:rPr>
+              <a:t>Target audience: This is a virtual garage sale accessible to everyone, whether a major reseller or your neighbour from across the street. The show-off car enthusiast, or the mum of 3 trying to make ends meet. </a:t>
             </a:r>
-            <a:endParaRPr dirty="0"/>
-          </a:p>
-          <a:p>
-            <a:pPr marL="0" lvl="0" indent="0" algn="l" rtl="0">
-              <a:spcBef>
+          </a:p>
+          <a:p>
+            <a:pPr marL="285750" indent="-285750">
+              <a:spcAft>
                 <a:spcPts val="1200"/>
-              </a:spcBef>
-              <a:spcAft>
-                <a:spcPts val="1200"/>
-              </a:spcAft>
-              <a:buNone/>
+              </a:spcAft>
             </a:pPr>
             <a:r>
-              <a:rPr lang="en-GB" dirty="0"/>
-              <a:t>Each car has its own specific details and reviews. Each car can also be specified by brand, quality of use and more. This will provide more details for users to carefully pick cars. </a:t>
+              <a:rPr lang="en-GB" dirty="0">
+                <a:solidFill>
+                  <a:schemeClr val="tx1"/>
+                </a:solidFill>
+                <a:latin typeface="+mn-lt"/>
+              </a:rPr>
+              <a:t>Functionality: Each car has its own specific details and reviews. Cars can also be filtered by brand, quality of use and more. This allow users to pick their future car carefully. </a:t>
             </a:r>
-            <a:endParaRPr dirty="0"/>
+          </a:p>
+          <a:p>
+            <a:pPr marL="285750" indent="-285750">
+              <a:spcAft>
+                <a:spcPts val="1200"/>
+              </a:spcAft>
+            </a:pPr>
+            <a:endParaRPr dirty="0">
+              <a:solidFill>
+                <a:schemeClr val="tx1"/>
+              </a:solidFill>
+              <a:latin typeface="+mn-lt"/>
+            </a:endParaRPr>
           </a:p>
         </p:txBody>
       </p:sp>
@@ -7686,14 +7850,13 @@
           </a:bodyPr>
           <a:lstStyle/>
           <a:p>
-            <a:pPr marL="228600" indent="-228600">
+            <a:pPr marL="285750" indent="-285750">
               <a:spcAft>
                 <a:spcPts val="1200"/>
               </a:spcAft>
-              <a:buAutoNum type="arabicPeriod"/>
             </a:pPr>
             <a:r>
-              <a:rPr lang="en-GB" sz="1200" b="0" i="0" dirty="0">
+              <a:rPr lang="en-GB" sz="1400" b="0" i="0" dirty="0">
                 <a:solidFill>
                   <a:schemeClr val="tx1"/>
                 </a:solidFill>
@@ -7703,7 +7866,7 @@
               <a:t>User registration and authentication (</a:t>
             </a:r>
             <a:r>
-              <a:rPr lang="en-US" sz="1200" dirty="0">
+              <a:rPr lang="en-US" sz="1400" dirty="0">
                 <a:solidFill>
                   <a:schemeClr val="tx1"/>
                 </a:solidFill>
@@ -7712,7 +7875,7 @@
               <a:t>u</a:t>
             </a:r>
             <a:r>
-              <a:rPr lang="en-US" sz="1200" b="0" i="0" dirty="0">
+              <a:rPr lang="en-US" sz="1400" b="0" i="0" dirty="0">
                 <a:solidFill>
                   <a:schemeClr val="tx1"/>
                 </a:solidFill>
@@ -7721,7 +7884,7 @@
               </a:rPr>
               <a:t>sers should be able to create an account and log in to the platform)</a:t>
             </a:r>
-            <a:endParaRPr lang="en-GB" sz="1200" b="0" i="0" dirty="0">
+            <a:endParaRPr lang="en-GB" sz="1400" b="0" i="0" dirty="0">
               <a:solidFill>
                 <a:schemeClr val="tx1"/>
               </a:solidFill>
@@ -7730,15 +7893,13 @@
             </a:endParaRPr>
           </a:p>
           <a:p>
-            <a:pPr marL="228600" indent="-228600">
+            <a:pPr marL="285750" indent="-285750">
               <a:spcAft>
                 <a:spcPts val="1200"/>
               </a:spcAft>
-              <a:buFont typeface="Arial"/>
-              <a:buAutoNum type="arabicPeriod"/>
             </a:pPr>
             <a:r>
-              <a:rPr lang="en-GB" sz="1200" b="0" i="0" dirty="0">
+              <a:rPr lang="en-GB" sz="1400" b="0" i="0" dirty="0">
                 <a:solidFill>
                   <a:schemeClr val="tx1"/>
                 </a:solidFill>
@@ -7748,7 +7909,7 @@
               <a:t>Vehicle listings and search (</a:t>
             </a:r>
             <a:r>
-              <a:rPr lang="en-US" sz="1200" dirty="0">
+              <a:rPr lang="en-US" sz="1400" dirty="0">
                 <a:solidFill>
                   <a:schemeClr val="tx1"/>
                 </a:solidFill>
@@ -7757,7 +7918,7 @@
               <a:t>u</a:t>
             </a:r>
             <a:r>
-              <a:rPr lang="en-US" sz="1200" b="0" i="0" dirty="0">
+              <a:rPr lang="en-US" sz="1400" b="0" i="0" dirty="0">
                 <a:solidFill>
                   <a:schemeClr val="tx1"/>
                 </a:solidFill>
@@ -7766,24 +7927,21 @@
               </a:rPr>
               <a:t>sers should be able to search for vehicles based on various criteria, such as make, model, year, price range, location, etc. They should be able to sort based on various criteria too. Sellers should be able to list their vehicles for sale, including uploading photos and providing detailed descriptions)</a:t>
             </a:r>
-            <a:endParaRPr lang="en-GB" sz="1200" b="0" i="0" dirty="0">
+            <a:endParaRPr lang="en-GB" sz="1400" dirty="0">
               <a:solidFill>
                 <a:schemeClr val="tx1"/>
               </a:solidFill>
-              <a:effectLst/>
               <a:latin typeface="+mn-lt"/>
             </a:endParaRPr>
           </a:p>
           <a:p>
-            <a:pPr marL="228600" indent="-228600">
+            <a:pPr marL="285750" indent="-285750">
               <a:spcAft>
                 <a:spcPts val="1200"/>
               </a:spcAft>
-              <a:buFont typeface="Arial"/>
-              <a:buAutoNum type="arabicPeriod"/>
             </a:pPr>
             <a:r>
-              <a:rPr lang="en-US" sz="1200" b="0" i="0" dirty="0">
+              <a:rPr lang="en-US" sz="1400" b="0" i="0" dirty="0">
                 <a:solidFill>
                   <a:schemeClr val="tx1"/>
                 </a:solidFill>
@@ -7794,15 +7952,13 @@
             </a:r>
           </a:p>
           <a:p>
-            <a:pPr marL="228600" indent="-228600">
+            <a:pPr marL="285750" indent="-285750">
               <a:spcAft>
                 <a:spcPts val="1200"/>
               </a:spcAft>
-              <a:buFont typeface="Arial"/>
-              <a:buAutoNum type="arabicPeriod"/>
             </a:pPr>
             <a:r>
-              <a:rPr lang="en-US" sz="1200" b="0" i="0" dirty="0">
+              <a:rPr lang="en-US" sz="1400" b="0" i="0" dirty="0">
                 <a:solidFill>
                   <a:schemeClr val="tx1"/>
                 </a:solidFill>
@@ -7909,7 +8065,7 @@
         </p:nvSpPr>
         <p:spPr>
           <a:xfrm>
-            <a:off x="311700" y="445025"/>
+            <a:off x="311700" y="151111"/>
             <a:ext cx="8520600" cy="572700"/>
           </a:xfrm>
           <a:prstGeom prst="rect">
@@ -7932,10 +8088,10 @@
               <a:buNone/>
             </a:pPr>
             <a:r>
-              <a:rPr lang="en-GB" u="sng"/>
+              <a:rPr lang="en-GB" u="sng" dirty="0"/>
               <a:t>Persona One </a:t>
             </a:r>
-            <a:endParaRPr u="sng"/>
+            <a:endParaRPr u="sng" dirty="0"/>
           </a:p>
         </p:txBody>
       </p:sp>
@@ -7951,8 +8107,8 @@
         </p:nvSpPr>
         <p:spPr>
           <a:xfrm>
-            <a:off x="311700" y="1152475"/>
-            <a:ext cx="8520600" cy="3416400"/>
+            <a:off x="560642" y="890858"/>
+            <a:ext cx="8325843" cy="3021771"/>
           </a:xfrm>
           <a:prstGeom prst="rect">
             <a:avLst/>
@@ -7964,6 +8120,40 @@
           </a:bodyPr>
           <a:lstStyle/>
           <a:p>
+            <a:pPr marL="285750" lvl="0" indent="-285750">
+              <a:spcAft>
+                <a:spcPts val="1200"/>
+              </a:spcAft>
+            </a:pPr>
+            <a:r>
+              <a:rPr lang="en-GB" sz="1600" dirty="0">
+                <a:solidFill>
+                  <a:schemeClr val="tx1"/>
+                </a:solidFill>
+                <a:latin typeface="+mn-lt"/>
+              </a:rPr>
+              <a:t>Warm welcome to Sin, 28. He managed to make a lot of money through questionable routes, but nevertheless he arrives to our virtual marketplace hungry. He already owns 5 luxury cars, but what's stopping him from acquiring (and </a:t>
+            </a:r>
+            <a:r>
+              <a:rPr lang="en-GB" sz="1600" dirty="0" err="1">
+                <a:solidFill>
+                  <a:schemeClr val="tx1"/>
+                </a:solidFill>
+                <a:latin typeface="+mn-lt"/>
+              </a:rPr>
+              <a:t>modding</a:t>
+            </a:r>
+            <a:r>
+              <a:rPr lang="en-GB" sz="1600" dirty="0">
+                <a:solidFill>
+                  <a:schemeClr val="tx1"/>
+                </a:solidFill>
+                <a:latin typeface="+mn-lt"/>
+              </a:rPr>
+              <a:t>) a new one? Not us! Sin is looking for the shiniest and fastest models of the market. Likely to be sorting by price descending despite having to scroll a bit.</a:t>
+            </a:r>
+          </a:p>
+          <a:p>
             <a:pPr marL="0" lvl="0" indent="0" algn="l" rtl="0">
               <a:spcBef>
                 <a:spcPts val="0"/>
@@ -7973,10 +8163,61 @@
               </a:spcAft>
               <a:buNone/>
             </a:pPr>
-            <a:endParaRPr/>
+            <a:r>
+              <a:rPr lang="en-GB" dirty="0"/>
+              <a:t> </a:t>
+            </a:r>
+            <a:endParaRPr dirty="0"/>
           </a:p>
         </p:txBody>
       </p:sp>
+      <p:pic>
+        <p:nvPicPr>
+          <p:cNvPr id="1026" name="Picture 2">
+            <a:extLst>
+              <a:ext uri="{FF2B5EF4-FFF2-40B4-BE49-F238E27FC236}">
+                <a16:creationId xmlns:a16="http://schemas.microsoft.com/office/drawing/2014/main" id="{345937A8-E4CB-6438-0A2C-E3E9C3EA6155}"/>
+              </a:ext>
+            </a:extLst>
+          </p:cNvPr>
+          <p:cNvPicPr>
+            <a:picLocks noChangeAspect="1" noChangeArrowheads="1"/>
+          </p:cNvPicPr>
+          <p:nvPr/>
+        </p:nvPicPr>
+        <p:blipFill>
+          <a:blip r:embed="rId3">
+            <a:extLst>
+              <a:ext uri="{28A0092B-C50C-407E-A947-70E740481C1C}">
+                <a14:useLocalDpi xmlns:a14="http://schemas.microsoft.com/office/drawing/2010/main" val="0"/>
+              </a:ext>
+            </a:extLst>
+          </a:blip>
+          <a:srcRect/>
+          <a:stretch>
+            <a:fillRect/>
+          </a:stretch>
+        </p:blipFill>
+        <p:spPr bwMode="auto">
+          <a:xfrm>
+            <a:off x="2781748" y="2741756"/>
+            <a:ext cx="3420834" cy="2008415"/>
+          </a:xfrm>
+          <a:prstGeom prst="rect">
+            <a:avLst/>
+          </a:prstGeom>
+          <a:noFill/>
+          <a:extLst>
+            <a:ext uri="{909E8E84-426E-40DD-AFC4-6F175D3DCCD1}">
+              <a14:hiddenFill xmlns:a14="http://schemas.microsoft.com/office/drawing/2010/main">
+                <a:solidFill>
+                  <a:srgbClr val="FFFFFF"/>
+                </a:solidFill>
+              </a14:hiddenFill>
+            </a:ext>
+          </a:extLst>
+        </p:spPr>
+      </p:pic>
     </p:spTree>
   </p:cSld>
   <p:clrMapOvr>
@@ -8014,7 +8255,7 @@
         </p:nvSpPr>
         <p:spPr>
           <a:xfrm>
-            <a:off x="311700" y="445025"/>
+            <a:off x="311700" y="208261"/>
             <a:ext cx="8520600" cy="572700"/>
           </a:xfrm>
           <a:prstGeom prst="rect">
@@ -8037,10 +8278,10 @@
               <a:buNone/>
             </a:pPr>
             <a:r>
-              <a:rPr lang="en-GB" u="sng"/>
+              <a:rPr lang="en-GB" u="sng" dirty="0"/>
               <a:t>Persona Two</a:t>
             </a:r>
-            <a:endParaRPr u="sng"/>
+            <a:endParaRPr u="sng" dirty="0"/>
           </a:p>
         </p:txBody>
       </p:sp>
@@ -8056,7 +8297,178 @@
         </p:nvSpPr>
         <p:spPr>
           <a:xfrm>
-            <a:off x="311700" y="1152475"/>
+            <a:off x="537238" y="780961"/>
+            <a:ext cx="8295062" cy="1884640"/>
+          </a:xfrm>
+          <a:prstGeom prst="rect">
+            <a:avLst/>
+          </a:prstGeom>
+        </p:spPr>
+        <p:txBody>
+          <a:bodyPr spcFirstLastPara="1" wrap="square" lIns="91425" tIns="91425" rIns="91425" bIns="91425" anchor="t" anchorCtr="0">
+            <a:normAutofit/>
+          </a:bodyPr>
+          <a:lstStyle/>
+          <a:p>
+            <a:pPr marL="285750" indent="-285750">
+              <a:lnSpc>
+                <a:spcPct val="125000"/>
+              </a:lnSpc>
+              <a:spcAft>
+                <a:spcPts val="1200"/>
+              </a:spcAft>
+            </a:pPr>
+            <a:r>
+              <a:rPr lang="en-GB" sz="1600" dirty="0">
+                <a:solidFill>
+                  <a:schemeClr val="tx1"/>
+                </a:solidFill>
+                <a:latin typeface="+mn-lt"/>
+              </a:rPr>
+              <a:t>This is Lizzy, 37. She does not have too much going for her financially, but she's never giving up. Lizzy is not looking for something pricey, she will have a quick look at the used section, as she needs something to just ride her 2 kids to lessons with, and call it a day. Value for money is of outermost importance for her!</a:t>
+            </a:r>
+          </a:p>
+          <a:p>
+            <a:pPr marL="0" lvl="0" indent="0" algn="l" rtl="0">
+              <a:spcBef>
+                <a:spcPts val="0"/>
+              </a:spcBef>
+              <a:spcAft>
+                <a:spcPts val="1200"/>
+              </a:spcAft>
+              <a:buNone/>
+            </a:pPr>
+            <a:endParaRPr lang="en-GB" dirty="0"/>
+          </a:p>
+        </p:txBody>
+      </p:sp>
+      <p:pic>
+        <p:nvPicPr>
+          <p:cNvPr id="2050" name="Picture 2">
+            <a:extLst>
+              <a:ext uri="{FF2B5EF4-FFF2-40B4-BE49-F238E27FC236}">
+                <a16:creationId xmlns:a16="http://schemas.microsoft.com/office/drawing/2014/main" id="{BE700471-6598-29B2-FCD9-68C26F734A8A}"/>
+              </a:ext>
+            </a:extLst>
+          </p:cNvPr>
+          <p:cNvPicPr>
+            <a:picLocks noChangeAspect="1" noChangeArrowheads="1"/>
+          </p:cNvPicPr>
+          <p:nvPr/>
+        </p:nvPicPr>
+        <p:blipFill>
+          <a:blip r:embed="rId3">
+            <a:extLst>
+              <a:ext uri="{28A0092B-C50C-407E-A947-70E740481C1C}">
+                <a14:useLocalDpi xmlns:a14="http://schemas.microsoft.com/office/drawing/2010/main" val="0"/>
+              </a:ext>
+            </a:extLst>
+          </a:blip>
+          <a:srcRect/>
+          <a:stretch>
+            <a:fillRect/>
+          </a:stretch>
+        </p:blipFill>
+        <p:spPr bwMode="auto">
+          <a:xfrm>
+            <a:off x="3224108" y="2220685"/>
+            <a:ext cx="2764462" cy="2595438"/>
+          </a:xfrm>
+          <a:prstGeom prst="rect">
+            <a:avLst/>
+          </a:prstGeom>
+          <a:noFill/>
+          <a:extLst>
+            <a:ext uri="{909E8E84-426E-40DD-AFC4-6F175D3DCCD1}">
+              <a14:hiddenFill xmlns:a14="http://schemas.microsoft.com/office/drawing/2010/main">
+                <a:solidFill>
+                  <a:srgbClr val="FFFFFF"/>
+                </a:solidFill>
+              </a14:hiddenFill>
+            </a:ext>
+          </a:extLst>
+        </p:spPr>
+      </p:pic>
+    </p:spTree>
+  </p:cSld>
+  <p:clrMapOvr>
+    <a:masterClrMapping/>
+  </p:clrMapOvr>
+</p:sld>
+</file>
+
+<file path=ppt/slides/slide6.xml><?xml version="1.0" encoding="utf-8"?>
+<p:sld xmlns:a="http://schemas.openxmlformats.org/drawingml/2006/main" xmlns:r="http://schemas.openxmlformats.org/officeDocument/2006/relationships" xmlns:p="http://schemas.openxmlformats.org/presentationml/2006/main">
+  <p:cSld>
+    <p:spTree>
+      <p:nvGrpSpPr>
+        <p:cNvPr id="1" name="Shape 77"/>
+        <p:cNvGrpSpPr/>
+        <p:nvPr/>
+      </p:nvGrpSpPr>
+      <p:grpSpPr>
+        <a:xfrm>
+          <a:off x="0" y="0"/>
+          <a:ext cx="0" cy="0"/>
+          <a:chOff x="0" y="0"/>
+          <a:chExt cx="0" cy="0"/>
+        </a:xfrm>
+      </p:grpSpPr>
+      <p:sp>
+        <p:nvSpPr>
+          <p:cNvPr id="78" name="Google Shape;78;p17"/>
+          <p:cNvSpPr txBox="1">
+            <a:spLocks noGrp="1"/>
+          </p:cNvSpPr>
+          <p:nvPr>
+            <p:ph type="title"/>
+          </p:nvPr>
+        </p:nvSpPr>
+        <p:spPr>
+          <a:xfrm>
+            <a:off x="311700" y="213850"/>
+            <a:ext cx="8520600" cy="572700"/>
+          </a:xfrm>
+          <a:prstGeom prst="rect">
+            <a:avLst/>
+          </a:prstGeom>
+        </p:spPr>
+        <p:txBody>
+          <a:bodyPr spcFirstLastPara="1" wrap="square" lIns="91425" tIns="91425" rIns="91425" bIns="91425" anchor="t" anchorCtr="0">
+            <a:normAutofit fontScale="90000"/>
+          </a:bodyPr>
+          <a:lstStyle/>
+          <a:p>
+            <a:pPr marL="0" lvl="0" indent="0" algn="ctr" rtl="0">
+              <a:spcBef>
+                <a:spcPts val="0"/>
+              </a:spcBef>
+              <a:spcAft>
+                <a:spcPts val="0"/>
+              </a:spcAft>
+              <a:buNone/>
+            </a:pPr>
+            <a:r>
+              <a:rPr lang="en-GB" u="sng" dirty="0"/>
+              <a:t>Persona Three</a:t>
+            </a:r>
+            <a:endParaRPr u="sng" dirty="0"/>
+          </a:p>
+        </p:txBody>
+      </p:sp>
+      <p:sp>
+        <p:nvSpPr>
+          <p:cNvPr id="79" name="Google Shape;79;p17"/>
+          <p:cNvSpPr txBox="1">
+            <a:spLocks noGrp="1"/>
+          </p:cNvSpPr>
+          <p:nvPr>
+            <p:ph type="body" idx="1"/>
+          </p:nvPr>
+        </p:nvSpPr>
+        <p:spPr>
+          <a:xfrm>
+            <a:off x="393343" y="863550"/>
             <a:ext cx="8520600" cy="3416400"/>
           </a:xfrm>
           <a:prstGeom prst="rect">
@@ -8078,11 +8490,77 @@
               </a:spcAft>
               <a:buNone/>
             </a:pPr>
-            <a:endParaRPr/>
+            <a:r>
+              <a:rPr lang="en-GB" sz="1600" dirty="0">
+                <a:solidFill>
+                  <a:schemeClr val="tx1"/>
+                </a:solidFill>
+                <a:latin typeface="+mn-lt"/>
+              </a:rPr>
+              <a:t>Finally, Tanya, 43. Despite being “more of a horse girl”, she's working as an agent representing a major automobile resale firm, and she's working on commission. She'll do her absolute best to maximize her company's profits by supplying with attractive pictures and descriptions of the car's she's managing. She will be responding to clients’ enquiries whenever her busy schedule allows for that and hope for the best.</a:t>
+            </a:r>
+            <a:endParaRPr sz="1600" dirty="0">
+              <a:solidFill>
+                <a:schemeClr val="tx1"/>
+              </a:solidFill>
+              <a:latin typeface="+mn-lt"/>
+            </a:endParaRPr>
           </a:p>
         </p:txBody>
       </p:sp>
+      <p:pic>
+        <p:nvPicPr>
+          <p:cNvPr id="3074" name="Picture 2">
+            <a:extLst>
+              <a:ext uri="{FF2B5EF4-FFF2-40B4-BE49-F238E27FC236}">
+                <a16:creationId xmlns:a16="http://schemas.microsoft.com/office/drawing/2014/main" id="{31DFCE8E-D362-1A56-697D-7CAC9362E1BC}"/>
+              </a:ext>
+            </a:extLst>
+          </p:cNvPr>
+          <p:cNvPicPr>
+            <a:picLocks noChangeAspect="1" noChangeArrowheads="1"/>
+          </p:cNvPicPr>
+          <p:nvPr/>
+        </p:nvPicPr>
+        <p:blipFill>
+          <a:blip r:embed="rId3">
+            <a:extLst>
+              <a:ext uri="{28A0092B-C50C-407E-A947-70E740481C1C}">
+                <a14:useLocalDpi xmlns:a14="http://schemas.microsoft.com/office/drawing/2010/main" val="0"/>
+              </a:ext>
+            </a:extLst>
+          </a:blip>
+          <a:srcRect/>
+          <a:stretch>
+            <a:fillRect/>
+          </a:stretch>
+        </p:blipFill>
+        <p:spPr bwMode="auto">
+          <a:xfrm>
+            <a:off x="2630048" y="2571750"/>
+            <a:ext cx="3564504" cy="2357900"/>
+          </a:xfrm>
+          <a:prstGeom prst="rect">
+            <a:avLst/>
+          </a:prstGeom>
+          <a:noFill/>
+          <a:extLst>
+            <a:ext uri="{909E8E84-426E-40DD-AFC4-6F175D3DCCD1}">
+              <a14:hiddenFill xmlns:a14="http://schemas.microsoft.com/office/drawing/2010/main">
+                <a:solidFill>
+                  <a:srgbClr val="FFFFFF"/>
+                </a:solidFill>
+              </a14:hiddenFill>
+            </a:ext>
+          </a:extLst>
+        </p:spPr>
+      </p:pic>
     </p:spTree>
+    <p:extLst>
+      <p:ext uri="{BB962C8B-B14F-4D97-AF65-F5344CB8AC3E}">
+        <p14:creationId xmlns:p14="http://schemas.microsoft.com/office/powerpoint/2010/main" val="4284810876"/>
+      </p:ext>
+    </p:extLst>
   </p:cSld>
   <p:clrMapOvr>
     <a:masterClrMapping/>
@@ -8090,7 +8568,7 @@
 </p:sld>
 </file>
 
-<file path=ppt/slides/slide6.xml><?xml version="1.0" encoding="utf-8"?>
+<file path=ppt/slides/slide7.xml><?xml version="1.0" encoding="utf-8"?>
 <p:sld xmlns:a="http://schemas.openxmlformats.org/drawingml/2006/main" xmlns:r="http://schemas.openxmlformats.org/officeDocument/2006/relationships" xmlns:p="http://schemas.openxmlformats.org/presentationml/2006/main">
   <p:cSld>
     <p:spTree>
@@ -8187,36 +8665,6 @@
           </a:p>
         </p:txBody>
       </p:sp>
-      <p:pic>
-        <p:nvPicPr>
-          <p:cNvPr id="2" name="Picture 1">
-            <a:extLst>
-              <a:ext uri="{FF2B5EF4-FFF2-40B4-BE49-F238E27FC236}">
-                <a16:creationId xmlns:a16="http://schemas.microsoft.com/office/drawing/2014/main" id="{F7A5E71F-47CB-E5D5-8681-FAE17EA2275B}"/>
-              </a:ext>
-            </a:extLst>
-          </p:cNvPr>
-          <p:cNvPicPr>
-            <a:picLocks noChangeAspect="1"/>
-          </p:cNvPicPr>
-          <p:nvPr/>
-        </p:nvPicPr>
-        <p:blipFill>
-          <a:blip r:embed="rId3"/>
-          <a:stretch>
-            <a:fillRect/>
-          </a:stretch>
-        </p:blipFill>
-        <p:spPr>
-          <a:xfrm>
-            <a:off x="51163" y="1152475"/>
-            <a:ext cx="8954186" cy="3546000"/>
-          </a:xfrm>
-          <a:prstGeom prst="rect">
-            <a:avLst/>
-          </a:prstGeom>
-        </p:spPr>
-      </p:pic>
     </p:spTree>
   </p:cSld>
   <p:clrMapOvr>
@@ -8225,7 +8673,7 @@
 </p:sld>
 </file>
 
-<file path=ppt/slides/slide7.xml><?xml version="1.0" encoding="utf-8"?>
+<file path=ppt/slides/slide8.xml><?xml version="1.0" encoding="utf-8"?>
 <p:sld xmlns:a="http://schemas.openxmlformats.org/drawingml/2006/main" xmlns:r="http://schemas.openxmlformats.org/officeDocument/2006/relationships" xmlns:p="http://schemas.openxmlformats.org/presentationml/2006/main">
   <p:cSld>
     <p:spTree>
@@ -8360,7 +8808,7 @@
 </p:sld>
 </file>
 
-<file path=ppt/slides/slide8.xml><?xml version="1.0" encoding="utf-8"?>
+<file path=ppt/slides/slide9.xml><?xml version="1.0" encoding="utf-8"?>
 <p:sld xmlns:a="http://schemas.openxmlformats.org/drawingml/2006/main" xmlns:r="http://schemas.openxmlformats.org/officeDocument/2006/relationships" xmlns:p="http://schemas.openxmlformats.org/presentationml/2006/main">
   <p:cSld>
     <p:spTree>
@@ -8453,19 +8901,13 @@
               </a:spcAft>
               <a:buNone/>
             </a:pPr>
-            <a:endParaRPr dirty="0"/>
+            <a:endParaRPr/>
           </a:p>
         </p:txBody>
       </p:sp>
       <p:pic>
         <p:nvPicPr>
-          <p:cNvPr id="2" name="Google Shape;98;p20">
-            <a:extLst>
-              <a:ext uri="{FF2B5EF4-FFF2-40B4-BE49-F238E27FC236}">
-                <a16:creationId xmlns:a16="http://schemas.microsoft.com/office/drawing/2014/main" id="{E3E974B9-B117-43D1-0E28-0785CE5B7D55}"/>
-              </a:ext>
-            </a:extLst>
-          </p:cNvPr>
+          <p:cNvPr id="98" name="Google Shape;98;p20"/>
           <p:cNvPicPr preferRelativeResize="0"/>
           <p:nvPr/>
         </p:nvPicPr>
@@ -8479,8 +8921,36 @@
         </p:blipFill>
         <p:spPr>
           <a:xfrm>
-            <a:off x="460917" y="869795"/>
-            <a:ext cx="8066049" cy="3888059"/>
+            <a:off x="235400" y="603175"/>
+            <a:ext cx="4882824" cy="2700801"/>
+          </a:xfrm>
+          <a:prstGeom prst="rect">
+            <a:avLst/>
+          </a:prstGeom>
+          <a:noFill/>
+          <a:ln>
+            <a:noFill/>
+          </a:ln>
+        </p:spPr>
+      </p:pic>
+      <p:pic>
+        <p:nvPicPr>
+          <p:cNvPr id="99" name="Google Shape;99;p20"/>
+          <p:cNvPicPr preferRelativeResize="0"/>
+          <p:nvPr/>
+        </p:nvPicPr>
+        <p:blipFill>
+          <a:blip r:embed="rId4">
+            <a:alphaModFix/>
+          </a:blip>
+          <a:stretch>
+            <a:fillRect/>
+          </a:stretch>
+        </p:blipFill>
+        <p:spPr>
+          <a:xfrm>
+            <a:off x="235400" y="3303973"/>
+            <a:ext cx="6370500" cy="1839525"/>
           </a:xfrm>
           <a:prstGeom prst="rect">
             <a:avLst/>
@@ -8492,123 +8962,6 @@
         </p:spPr>
       </p:pic>
     </p:spTree>
-  </p:cSld>
-  <p:clrMapOvr>
-    <a:masterClrMapping/>
-  </p:clrMapOvr>
-</p:sld>
-</file>
-
-<file path=ppt/slides/slide9.xml><?xml version="1.0" encoding="utf-8"?>
-<p:sld xmlns:a="http://schemas.openxmlformats.org/drawingml/2006/main" xmlns:r="http://schemas.openxmlformats.org/officeDocument/2006/relationships" xmlns:p="http://schemas.openxmlformats.org/presentationml/2006/main">
-  <p:cSld>
-    <p:spTree>
-      <p:nvGrpSpPr>
-        <p:cNvPr id="1" name=""/>
-        <p:cNvGrpSpPr/>
-        <p:nvPr/>
-      </p:nvGrpSpPr>
-      <p:grpSpPr>
-        <a:xfrm>
-          <a:off x="0" y="0"/>
-          <a:ext cx="0" cy="0"/>
-          <a:chOff x="0" y="0"/>
-          <a:chExt cx="0" cy="0"/>
-        </a:xfrm>
-      </p:grpSpPr>
-      <p:sp>
-        <p:nvSpPr>
-          <p:cNvPr id="2" name="Title 1">
-            <a:extLst>
-              <a:ext uri="{FF2B5EF4-FFF2-40B4-BE49-F238E27FC236}">
-                <a16:creationId xmlns:a16="http://schemas.microsoft.com/office/drawing/2014/main" id="{BBAE5423-B2A2-5D23-0EFB-6BDA5E695112}"/>
-              </a:ext>
-            </a:extLst>
-          </p:cNvPr>
-          <p:cNvSpPr>
-            <a:spLocks noGrp="1"/>
-          </p:cNvSpPr>
-          <p:nvPr>
-            <p:ph type="title"/>
-          </p:nvPr>
-        </p:nvSpPr>
-        <p:spPr/>
-        <p:txBody>
-          <a:bodyPr>
-            <a:normAutofit fontScale="90000"/>
-          </a:bodyPr>
-          <a:lstStyle/>
-          <a:p>
-            <a:pPr algn="ctr"/>
-            <a:r>
-              <a:rPr lang="en-GB" u="sng" dirty="0"/>
-              <a:t>ER Diagram entity attributes and fields</a:t>
-            </a:r>
-            <a:endParaRPr lang="en-GB" dirty="0"/>
-          </a:p>
-        </p:txBody>
-      </p:sp>
-      <p:sp>
-        <p:nvSpPr>
-          <p:cNvPr id="3" name="Text Placeholder 2">
-            <a:extLst>
-              <a:ext uri="{FF2B5EF4-FFF2-40B4-BE49-F238E27FC236}">
-                <a16:creationId xmlns:a16="http://schemas.microsoft.com/office/drawing/2014/main" id="{1CF80AEC-7219-653F-1651-0D63CC94D40A}"/>
-              </a:ext>
-            </a:extLst>
-          </p:cNvPr>
-          <p:cNvSpPr>
-            <a:spLocks noGrp="1"/>
-          </p:cNvSpPr>
-          <p:nvPr>
-            <p:ph type="body" idx="1"/>
-          </p:nvPr>
-        </p:nvSpPr>
-        <p:spPr/>
-        <p:txBody>
-          <a:bodyPr/>
-          <a:lstStyle/>
-          <a:p>
-            <a:endParaRPr lang="en-GB" dirty="0"/>
-          </a:p>
-        </p:txBody>
-      </p:sp>
-      <p:pic>
-        <p:nvPicPr>
-          <p:cNvPr id="4" name="Picture 3">
-            <a:extLst>
-              <a:ext uri="{FF2B5EF4-FFF2-40B4-BE49-F238E27FC236}">
-                <a16:creationId xmlns:a16="http://schemas.microsoft.com/office/drawing/2014/main" id="{860D3A00-2A58-D0C9-5D02-29219629C22D}"/>
-              </a:ext>
-            </a:extLst>
-          </p:cNvPr>
-          <p:cNvPicPr>
-            <a:picLocks noChangeAspect="1"/>
-          </p:cNvPicPr>
-          <p:nvPr/>
-        </p:nvPicPr>
-        <p:blipFill>
-          <a:blip r:embed="rId2"/>
-          <a:stretch>
-            <a:fillRect/>
-          </a:stretch>
-        </p:blipFill>
-        <p:spPr>
-          <a:xfrm>
-            <a:off x="261167" y="1152475"/>
-            <a:ext cx="8571133" cy="3174198"/>
-          </a:xfrm>
-          <a:prstGeom prst="rect">
-            <a:avLst/>
-          </a:prstGeom>
-        </p:spPr>
-      </p:pic>
-    </p:spTree>
-    <p:extLst>
-      <p:ext uri="{BB962C8B-B14F-4D97-AF65-F5344CB8AC3E}">
-        <p14:creationId xmlns:p14="http://schemas.microsoft.com/office/powerpoint/2010/main" val="231233261"/>
-      </p:ext>
-    </p:extLst>
   </p:cSld>
   <p:clrMapOvr>
     <a:masterClrMapping/>

</xml_diff>

<commit_message>
finish the wireframes and update url map
</commit_message>
<xml_diff>
--- a/Design Specification.pptx
+++ b/Design Specification.pptx
@@ -7524,7 +7524,45 @@
                   <a:schemeClr val="dk1"/>
                 </a:solidFill>
               </a:rPr>
-              <a:t>-/Home/MyAccount</a:t>
+              <a:t>-/Home/My-Account</a:t>
+            </a:r>
+          </a:p>
+          <a:p>
+            <a:pPr marL="0" lvl="0" indent="0" algn="l" rtl="0">
+              <a:spcBef>
+                <a:spcPts val="1200"/>
+              </a:spcBef>
+              <a:spcAft>
+                <a:spcPts val="0"/>
+              </a:spcAft>
+              <a:buNone/>
+            </a:pPr>
+            <a:r>
+              <a:rPr lang="en-GB" sz="1400" dirty="0">
+                <a:solidFill>
+                  <a:schemeClr val="dk1"/>
+                </a:solidFill>
+              </a:rPr>
+              <a:t>	-/Home/My-Account/My-Reviews</a:t>
+            </a:r>
+          </a:p>
+          <a:p>
+            <a:pPr marL="0" lvl="0" indent="0" algn="l" rtl="0">
+              <a:spcBef>
+                <a:spcPts val="1200"/>
+              </a:spcBef>
+              <a:spcAft>
+                <a:spcPts val="0"/>
+              </a:spcAft>
+              <a:buNone/>
+            </a:pPr>
+            <a:r>
+              <a:rPr lang="en-GB" sz="1400" dirty="0">
+                <a:solidFill>
+                  <a:schemeClr val="dk1"/>
+                </a:solidFill>
+              </a:rPr>
+              <a:t>	-/Home/My-Account/Review-Submission</a:t>
             </a:r>
             <a:endParaRPr sz="1400" dirty="0">
               <a:solidFill>

</xml_diff>